<commit_message>
Preparations for Lecture 5
</commit_message>
<xml_diff>
--- a/docs/lectures/wk5/ML_wk5_Modeleval_tuning.pptx
+++ b/docs/lectures/wk5/ML_wk5_Modeleval_tuning.pptx
@@ -6,7 +6,7 @@
     <p:sldMasterId id="2147483661" r:id="rId2"/>
   </p:sldMasterIdLst>
   <p:notesMasterIdLst>
-    <p:notesMasterId r:id="rId47"/>
+    <p:notesMasterId r:id="rId46"/>
   </p:notesMasterIdLst>
   <p:sldIdLst>
     <p:sldId id="256" r:id="rId3"/>
@@ -26,33 +26,32 @@
     <p:sldId id="271" r:id="rId17"/>
     <p:sldId id="272" r:id="rId18"/>
     <p:sldId id="273" r:id="rId19"/>
-    <p:sldId id="274" r:id="rId20"/>
-    <p:sldId id="275" r:id="rId21"/>
-    <p:sldId id="276" r:id="rId22"/>
-    <p:sldId id="277" r:id="rId23"/>
-    <p:sldId id="278" r:id="rId24"/>
-    <p:sldId id="279" r:id="rId25"/>
-    <p:sldId id="280" r:id="rId26"/>
-    <p:sldId id="281" r:id="rId27"/>
-    <p:sldId id="282" r:id="rId28"/>
-    <p:sldId id="283" r:id="rId29"/>
-    <p:sldId id="284" r:id="rId30"/>
-    <p:sldId id="285" r:id="rId31"/>
-    <p:sldId id="286" r:id="rId32"/>
-    <p:sldId id="312" r:id="rId33"/>
-    <p:sldId id="313" r:id="rId34"/>
-    <p:sldId id="287" r:id="rId35"/>
-    <p:sldId id="291" r:id="rId36"/>
-    <p:sldId id="288" r:id="rId37"/>
-    <p:sldId id="292" r:id="rId38"/>
-    <p:sldId id="315" r:id="rId39"/>
-    <p:sldId id="294" r:id="rId40"/>
-    <p:sldId id="295" r:id="rId41"/>
-    <p:sldId id="296" r:id="rId42"/>
-    <p:sldId id="297" r:id="rId43"/>
-    <p:sldId id="298" r:id="rId44"/>
-    <p:sldId id="299" r:id="rId45"/>
-    <p:sldId id="300" r:id="rId46"/>
+    <p:sldId id="275" r:id="rId20"/>
+    <p:sldId id="276" r:id="rId21"/>
+    <p:sldId id="277" r:id="rId22"/>
+    <p:sldId id="278" r:id="rId23"/>
+    <p:sldId id="279" r:id="rId24"/>
+    <p:sldId id="280" r:id="rId25"/>
+    <p:sldId id="281" r:id="rId26"/>
+    <p:sldId id="282" r:id="rId27"/>
+    <p:sldId id="283" r:id="rId28"/>
+    <p:sldId id="284" r:id="rId29"/>
+    <p:sldId id="285" r:id="rId30"/>
+    <p:sldId id="286" r:id="rId31"/>
+    <p:sldId id="312" r:id="rId32"/>
+    <p:sldId id="313" r:id="rId33"/>
+    <p:sldId id="287" r:id="rId34"/>
+    <p:sldId id="291" r:id="rId35"/>
+    <p:sldId id="288" r:id="rId36"/>
+    <p:sldId id="292" r:id="rId37"/>
+    <p:sldId id="315" r:id="rId38"/>
+    <p:sldId id="294" r:id="rId39"/>
+    <p:sldId id="295" r:id="rId40"/>
+    <p:sldId id="296" r:id="rId41"/>
+    <p:sldId id="297" r:id="rId42"/>
+    <p:sldId id="298" r:id="rId43"/>
+    <p:sldId id="299" r:id="rId44"/>
+    <p:sldId id="300" r:id="rId45"/>
   </p:sldIdLst>
   <p:sldSz cx="13004800" cy="9753600"/>
   <p:notesSz cx="6858000" cy="9144000"/>
@@ -545,6 +544,356 @@
 </p:notesMaster>
 </file>
 
+<file path=ppt/notesSlides/notesSlide1.xml><?xml version="1.0" encoding="utf-8"?>
+<p:notes xmlns:a="http://schemas.openxmlformats.org/drawingml/2006/main" xmlns:r="http://schemas.openxmlformats.org/officeDocument/2006/relationships" xmlns:p="http://schemas.openxmlformats.org/presentationml/2006/main">
+  <p:cSld>
+    <p:spTree>
+      <p:nvGrpSpPr>
+        <p:cNvPr id="1" name=""/>
+        <p:cNvGrpSpPr/>
+        <p:nvPr/>
+      </p:nvGrpSpPr>
+      <p:grpSpPr>
+        <a:xfrm>
+          <a:off x="0" y="0"/>
+          <a:ext cx="0" cy="0"/>
+          <a:chOff x="0" y="0"/>
+          <a:chExt cx="0" cy="0"/>
+        </a:xfrm>
+      </p:grpSpPr>
+      <p:sp>
+        <p:nvSpPr>
+          <p:cNvPr id="2" name="Tijdelijke aanduiding voor dia-afbeelding 1"/>
+          <p:cNvSpPr>
+            <a:spLocks noGrp="1" noRot="1" noChangeAspect="1"/>
+          </p:cNvSpPr>
+          <p:nvPr>
+            <p:ph type="sldImg"/>
+          </p:nvPr>
+        </p:nvSpPr>
+        <p:spPr/>
+      </p:sp>
+      <p:sp>
+        <p:nvSpPr>
+          <p:cNvPr id="3" name="Tijdelijke aanduiding voor notities 2"/>
+          <p:cNvSpPr>
+            <a:spLocks noGrp="1"/>
+          </p:cNvSpPr>
+          <p:nvPr>
+            <p:ph type="body" idx="1"/>
+          </p:nvPr>
+        </p:nvSpPr>
+        <p:spPr/>
+        <p:txBody>
+          <a:bodyPr/>
+          <a:lstStyle/>
+          <a:p>
+            <a:r>
+              <a:rPr lang="nl-NL"/>
+              <a:t>Regularisatie, parameter C.</a:t>
+            </a:r>
+          </a:p>
+          <a:p>
+            <a:r>
+              <a:rPr lang="nl-NL"/>
+              <a:t>Hoge C = lage regularisatie = smalle straat = kleine bias, hoge variance -&gt; kans op overfitting</a:t>
+            </a:r>
+          </a:p>
+          <a:p>
+            <a:r>
+              <a:rPr lang="nl-NL"/>
+              <a:t>Lage C = hoge regularisatie = brede straat = grotere bias, lagere variance -&gt; kans op underfitting</a:t>
+            </a:r>
+          </a:p>
+        </p:txBody>
+      </p:sp>
+    </p:spTree>
+    <p:extLst>
+      <p:ext uri="{BB962C8B-B14F-4D97-AF65-F5344CB8AC3E}">
+        <p14:creationId xmlns:p14="http://schemas.microsoft.com/office/powerpoint/2010/main" val="3520197259"/>
+      </p:ext>
+    </p:extLst>
+  </p:cSld>
+  <p:clrMapOvr>
+    <a:masterClrMapping/>
+  </p:clrMapOvr>
+</p:notes>
+</file>
+
+<file path=ppt/notesSlides/notesSlide2.xml><?xml version="1.0" encoding="utf-8"?>
+<p:notes xmlns:a="http://schemas.openxmlformats.org/drawingml/2006/main" xmlns:r="http://schemas.openxmlformats.org/officeDocument/2006/relationships" xmlns:p="http://schemas.openxmlformats.org/presentationml/2006/main">
+  <p:cSld>
+    <p:spTree>
+      <p:nvGrpSpPr>
+        <p:cNvPr id="1" name=""/>
+        <p:cNvGrpSpPr/>
+        <p:nvPr/>
+      </p:nvGrpSpPr>
+      <p:grpSpPr>
+        <a:xfrm>
+          <a:off x="0" y="0"/>
+          <a:ext cx="0" cy="0"/>
+          <a:chOff x="0" y="0"/>
+          <a:chExt cx="0" cy="0"/>
+        </a:xfrm>
+      </p:grpSpPr>
+      <p:sp>
+        <p:nvSpPr>
+          <p:cNvPr id="2" name="Tijdelijke aanduiding voor dia-afbeelding 1"/>
+          <p:cNvSpPr>
+            <a:spLocks noGrp="1" noRot="1" noChangeAspect="1"/>
+          </p:cNvSpPr>
+          <p:nvPr>
+            <p:ph type="sldImg"/>
+          </p:nvPr>
+        </p:nvSpPr>
+        <p:spPr/>
+      </p:sp>
+      <p:sp>
+        <p:nvSpPr>
+          <p:cNvPr id="3" name="Tijdelijke aanduiding voor notities 2"/>
+          <p:cNvSpPr>
+            <a:spLocks noGrp="1"/>
+          </p:cNvSpPr>
+          <p:nvPr>
+            <p:ph type="body" idx="1"/>
+          </p:nvPr>
+        </p:nvSpPr>
+        <p:spPr/>
+        <p:txBody>
+          <a:bodyPr/>
+          <a:lstStyle/>
+          <a:p>
+            <a:r>
+              <a:rPr lang="nl-NL"/>
+              <a:t>Werkt bij ongeveer gelijke verdelingen (50% Virginica, 50% Setosa).</a:t>
+            </a:r>
+          </a:p>
+          <a:p>
+            <a:r>
+              <a:rPr lang="nl-NL"/>
+              <a:t>Werkt niet als de ene categorie veel zeldzamer is dan de andere (99% goedaardige tumor, 1% kwaadaardig =&gt; als je die ene mist is je accuracy nog steeds 0,99 maar je model is waardeloos).</a:t>
+            </a:r>
+          </a:p>
+        </p:txBody>
+      </p:sp>
+    </p:spTree>
+    <p:extLst>
+      <p:ext uri="{BB962C8B-B14F-4D97-AF65-F5344CB8AC3E}">
+        <p14:creationId xmlns:p14="http://schemas.microsoft.com/office/powerpoint/2010/main" val="4218382829"/>
+      </p:ext>
+    </p:extLst>
+  </p:cSld>
+  <p:clrMapOvr>
+    <a:masterClrMapping/>
+  </p:clrMapOvr>
+</p:notes>
+</file>
+
+<file path=ppt/notesSlides/notesSlide3.xml><?xml version="1.0" encoding="utf-8"?>
+<p:notes xmlns:a="http://schemas.openxmlformats.org/drawingml/2006/main" xmlns:r="http://schemas.openxmlformats.org/officeDocument/2006/relationships" xmlns:p="http://schemas.openxmlformats.org/presentationml/2006/main">
+  <p:cSld>
+    <p:spTree>
+      <p:nvGrpSpPr>
+        <p:cNvPr id="1" name=""/>
+        <p:cNvGrpSpPr/>
+        <p:nvPr/>
+      </p:nvGrpSpPr>
+      <p:grpSpPr>
+        <a:xfrm>
+          <a:off x="0" y="0"/>
+          <a:ext cx="0" cy="0"/>
+          <a:chOff x="0" y="0"/>
+          <a:chExt cx="0" cy="0"/>
+        </a:xfrm>
+      </p:grpSpPr>
+      <p:sp>
+        <p:nvSpPr>
+          <p:cNvPr id="2" name="Tijdelijke aanduiding voor dia-afbeelding 1"/>
+          <p:cNvSpPr>
+            <a:spLocks noGrp="1" noRot="1" noChangeAspect="1"/>
+          </p:cNvSpPr>
+          <p:nvPr>
+            <p:ph type="sldImg"/>
+          </p:nvPr>
+        </p:nvSpPr>
+        <p:spPr/>
+      </p:sp>
+      <p:sp>
+        <p:nvSpPr>
+          <p:cNvPr id="3" name="Tijdelijke aanduiding voor notities 2"/>
+          <p:cNvSpPr>
+            <a:spLocks noGrp="1"/>
+          </p:cNvSpPr>
+          <p:nvPr>
+            <p:ph type="body" idx="1"/>
+          </p:nvPr>
+        </p:nvSpPr>
+        <p:spPr/>
+        <p:txBody>
+          <a:bodyPr/>
+          <a:lstStyle/>
+          <a:p>
+            <a:r>
+              <a:rPr lang="nl-NL"/>
+              <a:t>Kromme die op 1 begint (recall 0 = precision 1, als je alles mist hebt je ook geen FP’s) en dan (hopelijk) langzaam afloopt.</a:t>
+            </a:r>
+          </a:p>
+        </p:txBody>
+      </p:sp>
+    </p:spTree>
+    <p:extLst>
+      <p:ext uri="{BB962C8B-B14F-4D97-AF65-F5344CB8AC3E}">
+        <p14:creationId xmlns:p14="http://schemas.microsoft.com/office/powerpoint/2010/main" val="1678877852"/>
+      </p:ext>
+    </p:extLst>
+  </p:cSld>
+  <p:clrMapOvr>
+    <a:masterClrMapping/>
+  </p:clrMapOvr>
+</p:notes>
+</file>
+
+<file path=ppt/notesSlides/notesSlide4.xml><?xml version="1.0" encoding="utf-8"?>
+<p:notes xmlns:a="http://schemas.openxmlformats.org/drawingml/2006/main" xmlns:r="http://schemas.openxmlformats.org/officeDocument/2006/relationships" xmlns:p="http://schemas.openxmlformats.org/presentationml/2006/main">
+  <p:cSld>
+    <p:spTree>
+      <p:nvGrpSpPr>
+        <p:cNvPr id="1" name=""/>
+        <p:cNvGrpSpPr/>
+        <p:nvPr/>
+      </p:nvGrpSpPr>
+      <p:grpSpPr>
+        <a:xfrm>
+          <a:off x="0" y="0"/>
+          <a:ext cx="0" cy="0"/>
+          <a:chOff x="0" y="0"/>
+          <a:chExt cx="0" cy="0"/>
+        </a:xfrm>
+      </p:grpSpPr>
+      <p:sp>
+        <p:nvSpPr>
+          <p:cNvPr id="2" name="Tijdelijke aanduiding voor dia-afbeelding 1"/>
+          <p:cNvSpPr>
+            <a:spLocks noGrp="1" noRot="1" noChangeAspect="1"/>
+          </p:cNvSpPr>
+          <p:nvPr>
+            <p:ph type="sldImg"/>
+          </p:nvPr>
+        </p:nvSpPr>
+        <p:spPr/>
+      </p:sp>
+      <p:sp>
+        <p:nvSpPr>
+          <p:cNvPr id="3" name="Tijdelijke aanduiding voor notities 2"/>
+          <p:cNvSpPr>
+            <a:spLocks noGrp="1"/>
+          </p:cNvSpPr>
+          <p:nvPr>
+            <p:ph type="body" idx="1"/>
+          </p:nvPr>
+        </p:nvSpPr>
+        <p:spPr/>
+        <p:txBody>
+          <a:bodyPr/>
+          <a:lstStyle/>
+          <a:p>
+            <a:r>
+              <a:rPr lang="nl-NL"/>
+              <a:t>Hulpmiddel bij vorige slide. Zetten we het criterium naar links, dan neemt de Recall toe maar ten koste van de Precision (ook veel niet-Virginica’s worden als Virginica gezien).</a:t>
+            </a:r>
+          </a:p>
+          <a:p>
+            <a:r>
+              <a:rPr lang="nl-NL"/>
+              <a:t>Zetten we het criterium naar rechts, dan daalt de Recall (we gaan meer Virginica’s missen) maar neemt de Precision toe.</a:t>
+            </a:r>
+          </a:p>
+        </p:txBody>
+      </p:sp>
+    </p:spTree>
+    <p:extLst>
+      <p:ext uri="{BB962C8B-B14F-4D97-AF65-F5344CB8AC3E}">
+        <p14:creationId xmlns:p14="http://schemas.microsoft.com/office/powerpoint/2010/main" val="3383823379"/>
+      </p:ext>
+    </p:extLst>
+  </p:cSld>
+  <p:clrMapOvr>
+    <a:masterClrMapping/>
+  </p:clrMapOvr>
+</p:notes>
+</file>
+
+<file path=ppt/notesSlides/notesSlide5.xml><?xml version="1.0" encoding="utf-8"?>
+<p:notes xmlns:a="http://schemas.openxmlformats.org/drawingml/2006/main" xmlns:r="http://schemas.openxmlformats.org/officeDocument/2006/relationships" xmlns:p="http://schemas.openxmlformats.org/presentationml/2006/main">
+  <p:cSld>
+    <p:spTree>
+      <p:nvGrpSpPr>
+        <p:cNvPr id="1" name=""/>
+        <p:cNvGrpSpPr/>
+        <p:nvPr/>
+      </p:nvGrpSpPr>
+      <p:grpSpPr>
+        <a:xfrm>
+          <a:off x="0" y="0"/>
+          <a:ext cx="0" cy="0"/>
+          <a:chOff x="0" y="0"/>
+          <a:chExt cx="0" cy="0"/>
+        </a:xfrm>
+      </p:grpSpPr>
+      <p:sp>
+        <p:nvSpPr>
+          <p:cNvPr id="2" name="Tijdelijke aanduiding voor dia-afbeelding 1"/>
+          <p:cNvSpPr>
+            <a:spLocks noGrp="1" noRot="1" noChangeAspect="1"/>
+          </p:cNvSpPr>
+          <p:nvPr>
+            <p:ph type="sldImg"/>
+          </p:nvPr>
+        </p:nvSpPr>
+        <p:spPr/>
+      </p:sp>
+      <p:sp>
+        <p:nvSpPr>
+          <p:cNvPr id="3" name="Tijdelijke aanduiding voor notities 2"/>
+          <p:cNvSpPr>
+            <a:spLocks noGrp="1"/>
+          </p:cNvSpPr>
+          <p:nvPr>
+            <p:ph type="body" idx="1"/>
+          </p:nvPr>
+        </p:nvSpPr>
+        <p:spPr/>
+        <p:txBody>
+          <a:bodyPr/>
+          <a:lstStyle/>
+          <a:p>
+            <a:r>
+              <a:rPr lang="nl-NL"/>
+              <a:t>X-as = FPR = FP / (FP + TN), dus aandeel van de FP’s in alle gevallen dat de werkelijke waarde 0/false is.</a:t>
+            </a:r>
+          </a:p>
+          <a:p>
+            <a:r>
+              <a:rPr lang="nl-NL"/>
+              <a:t>Y-as = TPR = TP / (TP + FN), dus aandeel van de TP’s in alle gevallen dat de werkelijke waarde 1/true is.</a:t>
+            </a:r>
+          </a:p>
+        </p:txBody>
+      </p:sp>
+    </p:spTree>
+    <p:extLst>
+      <p:ext uri="{BB962C8B-B14F-4D97-AF65-F5344CB8AC3E}">
+        <p14:creationId xmlns:p14="http://schemas.microsoft.com/office/powerpoint/2010/main" val="3644200587"/>
+      </p:ext>
+    </p:extLst>
+  </p:cSld>
+  <p:clrMapOvr>
+    <a:masterClrMapping/>
+  </p:clrMapOvr>
+</p:notes>
+</file>
+
 <file path=ppt/slideLayouts/slideLayout1.xml><?xml version="1.0" encoding="utf-8"?>
 <p:sldLayout xmlns:a="http://schemas.openxmlformats.org/drawingml/2006/main" xmlns:r="http://schemas.openxmlformats.org/officeDocument/2006/relationships" xmlns:p="http://schemas.openxmlformats.org/presentationml/2006/main" type="title">
   <p:cSld name="Titel en subtitel">
@@ -1115,7 +1464,7 @@
           <a:p>
             <a:fld id="{E43C3D67-E41A-49CD-A81C-4E2A886E7BC5}" type="datetimeFigureOut">
               <a:rPr lang="nl-NL" smtClean="0"/>
-              <a:t>13-6-2025</a:t>
+              <a:t>6-10-2025</a:t>
             </a:fld>
             <a:endParaRPr lang="nl-NL"/>
           </a:p>
@@ -1335,7 +1684,7 @@
           <a:p>
             <a:fld id="{E43C3D67-E41A-49CD-A81C-4E2A886E7BC5}" type="datetimeFigureOut">
               <a:rPr lang="nl-NL" smtClean="0"/>
-              <a:t>13-6-2025</a:t>
+              <a:t>6-10-2025</a:t>
             </a:fld>
             <a:endParaRPr lang="nl-NL"/>
           </a:p>
@@ -1533,7 +1882,7 @@
           <a:p>
             <a:fld id="{E43C3D67-E41A-49CD-A81C-4E2A886E7BC5}" type="datetimeFigureOut">
               <a:rPr lang="nl-NL" smtClean="0"/>
-              <a:t>13-6-2025</a:t>
+              <a:t>6-10-2025</a:t>
             </a:fld>
             <a:endParaRPr lang="nl-NL"/>
           </a:p>
@@ -1808,7 +2157,7 @@
           <a:p>
             <a:fld id="{E43C3D67-E41A-49CD-A81C-4E2A886E7BC5}" type="datetimeFigureOut">
               <a:rPr lang="nl-NL" smtClean="0"/>
-              <a:t>13-6-2025</a:t>
+              <a:t>6-10-2025</a:t>
             </a:fld>
             <a:endParaRPr lang="nl-NL"/>
           </a:p>
@@ -2073,7 +2422,7 @@
           <a:p>
             <a:fld id="{E43C3D67-E41A-49CD-A81C-4E2A886E7BC5}" type="datetimeFigureOut">
               <a:rPr lang="nl-NL" smtClean="0"/>
-              <a:t>13-6-2025</a:t>
+              <a:t>6-10-2025</a:t>
             </a:fld>
             <a:endParaRPr lang="nl-NL"/>
           </a:p>
@@ -2485,7 +2834,7 @@
           <a:p>
             <a:fld id="{E43C3D67-E41A-49CD-A81C-4E2A886E7BC5}" type="datetimeFigureOut">
               <a:rPr lang="nl-NL" smtClean="0"/>
-              <a:t>13-6-2025</a:t>
+              <a:t>6-10-2025</a:t>
             </a:fld>
             <a:endParaRPr lang="nl-NL"/>
           </a:p>
@@ -2626,7 +2975,7 @@
           <a:p>
             <a:fld id="{E43C3D67-E41A-49CD-A81C-4E2A886E7BC5}" type="datetimeFigureOut">
               <a:rPr lang="nl-NL" smtClean="0"/>
-              <a:t>13-6-2025</a:t>
+              <a:t>6-10-2025</a:t>
             </a:fld>
             <a:endParaRPr lang="nl-NL"/>
           </a:p>
@@ -2947,7 +3296,7 @@
           <a:p>
             <a:fld id="{E43C3D67-E41A-49CD-A81C-4E2A886E7BC5}" type="datetimeFigureOut">
               <a:rPr lang="nl-NL" smtClean="0"/>
-              <a:t>13-6-2025</a:t>
+              <a:t>6-10-2025</a:t>
             </a:fld>
             <a:endParaRPr lang="nl-NL"/>
           </a:p>
@@ -3258,7 +3607,7 @@
           <a:p>
             <a:fld id="{E43C3D67-E41A-49CD-A81C-4E2A886E7BC5}" type="datetimeFigureOut">
               <a:rPr lang="nl-NL" smtClean="0"/>
-              <a:t>13-6-2025</a:t>
+              <a:t>6-10-2025</a:t>
             </a:fld>
             <a:endParaRPr lang="nl-NL"/>
           </a:p>
@@ -3546,7 +3895,7 @@
           <a:p>
             <a:fld id="{E43C3D67-E41A-49CD-A81C-4E2A886E7BC5}" type="datetimeFigureOut">
               <a:rPr lang="nl-NL" smtClean="0"/>
-              <a:t>13-6-2025</a:t>
+              <a:t>6-10-2025</a:t>
             </a:fld>
             <a:endParaRPr lang="nl-NL"/>
           </a:p>
@@ -3744,7 +4093,7 @@
           <a:p>
             <a:fld id="{E43C3D67-E41A-49CD-A81C-4E2A886E7BC5}" type="datetimeFigureOut">
               <a:rPr lang="nl-NL" smtClean="0"/>
-              <a:t>13-6-2025</a:t>
+              <a:t>6-10-2025</a:t>
             </a:fld>
             <a:endParaRPr lang="nl-NL"/>
           </a:p>
@@ -3952,7 +4301,7 @@
           <a:p>
             <a:fld id="{E43C3D67-E41A-49CD-A81C-4E2A886E7BC5}" type="datetimeFigureOut">
               <a:rPr lang="nl-NL" smtClean="0"/>
-              <a:t>13-6-2025</a:t>
+              <a:t>6-10-2025</a:t>
             </a:fld>
             <a:endParaRPr lang="nl-NL"/>
           </a:p>
@@ -5056,7 +5405,7 @@
           </a:ln>
           <a:extLst>
             <a:ext uri="{C572A759-6A51-4108-AA02-DFA0A04FC94B}">
-              <ma14:wrappingTextBoxFlag xmlns:ma14="http://schemas.microsoft.com/office/mac/drawingml/2011/main" xmlns:a14="http://schemas.microsoft.com/office/drawing/2010/main" xmlns:m="http://schemas.openxmlformats.org/officeDocument/2006/math" xmlns="" val="1"/>
+              <ma14:wrappingTextBoxFlag xmlns="" xmlns:m="http://schemas.openxmlformats.org/officeDocument/2006/math" xmlns:a14="http://schemas.microsoft.com/office/drawing/2010/main" xmlns:ma14="http://schemas.microsoft.com/office/mac/drawingml/2011/main" val="1"/>
             </a:ext>
           </a:extLst>
         </p:spPr>
@@ -5095,7 +5444,7 @@
           </a:ln>
           <a:extLst>
             <a:ext uri="{C572A759-6A51-4108-AA02-DFA0A04FC94B}">
-              <ma14:wrappingTextBoxFlag xmlns:ma14="http://schemas.microsoft.com/office/mac/drawingml/2011/main" xmlns:a14="http://schemas.microsoft.com/office/drawing/2010/main" xmlns:m="http://schemas.openxmlformats.org/officeDocument/2006/math" xmlns="" val="1"/>
+              <ma14:wrappingTextBoxFlag xmlns="" xmlns:m="http://schemas.openxmlformats.org/officeDocument/2006/math" xmlns:a14="http://schemas.microsoft.com/office/drawing/2010/main" xmlns:ma14="http://schemas.microsoft.com/office/mac/drawingml/2011/main" val="1"/>
             </a:ext>
           </a:extLst>
         </p:spPr>
@@ -6074,7 +6423,7 @@
           <a:p>
             <a:fld id="{E43C3D67-E41A-49CD-A81C-4E2A886E7BC5}" type="datetimeFigureOut">
               <a:rPr lang="nl-NL" smtClean="0"/>
-              <a:t>13-6-2025</a:t>
+              <a:t>6-10-2025</a:t>
             </a:fld>
             <a:endParaRPr lang="nl-NL"/>
           </a:p>
@@ -6538,7 +6887,7 @@
           </a:ln>
           <a:extLst>
             <a:ext uri="{C572A759-6A51-4108-AA02-DFA0A04FC94B}">
-              <ma14:wrappingTextBoxFlag xmlns:ma14="http://schemas.microsoft.com/office/mac/drawingml/2011/main" xmlns:a14="http://schemas.microsoft.com/office/drawing/2010/main" xmlns:m="http://schemas.openxmlformats.org/officeDocument/2006/math" xmlns="" val="1"/>
+              <ma14:wrappingTextBoxFlag xmlns="" xmlns:m="http://schemas.openxmlformats.org/officeDocument/2006/math" xmlns:a14="http://schemas.microsoft.com/office/drawing/2010/main" xmlns:ma14="http://schemas.microsoft.com/office/mac/drawingml/2011/main" val="1"/>
             </a:ext>
           </a:extLst>
         </p:spPr>
@@ -6625,7 +6974,7 @@
           </a:ln>
           <a:extLst>
             <a:ext uri="{C572A759-6A51-4108-AA02-DFA0A04FC94B}">
-              <ma14:wrappingTextBoxFlag xmlns:ma14="http://schemas.microsoft.com/office/mac/drawingml/2011/main" xmlns:a14="http://schemas.microsoft.com/office/drawing/2010/main" xmlns:m="http://schemas.openxmlformats.org/officeDocument/2006/math" xmlns="" val="1"/>
+              <ma14:wrappingTextBoxFlag xmlns="" xmlns:m="http://schemas.openxmlformats.org/officeDocument/2006/math" xmlns:a14="http://schemas.microsoft.com/office/drawing/2010/main" xmlns:ma14="http://schemas.microsoft.com/office/mac/drawingml/2011/main" val="1"/>
             </a:ext>
           </a:extLst>
         </p:spPr>
@@ -6669,7 +7018,7 @@
           </a:ln>
           <a:extLst>
             <a:ext uri="{C572A759-6A51-4108-AA02-DFA0A04FC94B}">
-              <ma14:wrappingTextBoxFlag xmlns:ma14="http://schemas.microsoft.com/office/mac/drawingml/2011/main" xmlns:a14="http://schemas.microsoft.com/office/drawing/2010/main" xmlns:m="http://schemas.openxmlformats.org/officeDocument/2006/math" xmlns="" val="1"/>
+              <ma14:wrappingTextBoxFlag xmlns="" xmlns:m="http://schemas.openxmlformats.org/officeDocument/2006/math" xmlns:a14="http://schemas.microsoft.com/office/drawing/2010/main" xmlns:ma14="http://schemas.microsoft.com/office/mac/drawingml/2011/main" val="1"/>
             </a:ext>
           </a:extLst>
         </p:spPr>
@@ -6716,7 +7065,7 @@
           </a:ln>
           <a:extLst>
             <a:ext uri="{C572A759-6A51-4108-AA02-DFA0A04FC94B}">
-              <ma14:wrappingTextBoxFlag xmlns:ma14="http://schemas.microsoft.com/office/mac/drawingml/2011/main" xmlns:a14="http://schemas.microsoft.com/office/drawing/2010/main" xmlns:m="http://schemas.openxmlformats.org/officeDocument/2006/math" xmlns="" val="1"/>
+              <ma14:wrappingTextBoxFlag xmlns="" xmlns:m="http://schemas.openxmlformats.org/officeDocument/2006/math" xmlns:a14="http://schemas.microsoft.com/office/drawing/2010/main" xmlns:ma14="http://schemas.microsoft.com/office/mac/drawingml/2011/main" val="1"/>
             </a:ext>
           </a:extLst>
         </p:spPr>
@@ -6760,7 +7109,7 @@
           </a:ln>
           <a:extLst>
             <a:ext uri="{C572A759-6A51-4108-AA02-DFA0A04FC94B}">
-              <ma14:wrappingTextBoxFlag xmlns:ma14="http://schemas.microsoft.com/office/mac/drawingml/2011/main" xmlns:a14="http://schemas.microsoft.com/office/drawing/2010/main" xmlns:m="http://schemas.openxmlformats.org/officeDocument/2006/math" xmlns="" val="1"/>
+              <ma14:wrappingTextBoxFlag xmlns="" xmlns:m="http://schemas.openxmlformats.org/officeDocument/2006/math" xmlns:a14="http://schemas.microsoft.com/office/drawing/2010/main" xmlns:ma14="http://schemas.microsoft.com/office/mac/drawingml/2011/main" val="1"/>
             </a:ext>
           </a:extLst>
         </p:spPr>
@@ -6810,7 +7159,7 @@
           </a:ln>
           <a:extLst>
             <a:ext uri="{C572A759-6A51-4108-AA02-DFA0A04FC94B}">
-              <ma14:wrappingTextBoxFlag xmlns:ma14="http://schemas.microsoft.com/office/mac/drawingml/2011/main" xmlns:a14="http://schemas.microsoft.com/office/drawing/2010/main" xmlns:m="http://schemas.openxmlformats.org/officeDocument/2006/math" xmlns="" val="1"/>
+              <ma14:wrappingTextBoxFlag xmlns="" xmlns:m="http://schemas.openxmlformats.org/officeDocument/2006/math" xmlns:a14="http://schemas.microsoft.com/office/drawing/2010/main" xmlns:ma14="http://schemas.microsoft.com/office/mac/drawingml/2011/main" val="1"/>
             </a:ext>
           </a:extLst>
         </p:spPr>
@@ -6905,7 +7254,7 @@
             <a:effectLst/>
             <a:extLst>
               <a:ext uri="{C572A759-6A51-4108-AA02-DFA0A04FC94B}">
-                <ma14:wrappingTextBoxFlag xmlns:ma14="http://schemas.microsoft.com/office/mac/drawingml/2011/main" xmlns:a14="http://schemas.microsoft.com/office/drawing/2010/main" xmlns:m="http://schemas.openxmlformats.org/officeDocument/2006/math" xmlns="" val="1"/>
+                <ma14:wrappingTextBoxFlag xmlns="" xmlns:m="http://schemas.openxmlformats.org/officeDocument/2006/math" xmlns:a14="http://schemas.microsoft.com/office/drawing/2010/main" xmlns:ma14="http://schemas.microsoft.com/office/mac/drawingml/2011/main" val="1"/>
               </a:ext>
             </a:extLst>
           </p:spPr>
@@ -6939,7 +7288,7 @@
             <p:nvPr/>
           </p:nvPicPr>
           <p:blipFill>
-            <a:blip r:embed="rId2"/>
+            <a:blip r:embed="rId3"/>
             <a:stretch>
               <a:fillRect/>
             </a:stretch>
@@ -7005,7 +7354,7 @@
           </a:ln>
           <a:extLst>
             <a:ext uri="{C572A759-6A51-4108-AA02-DFA0A04FC94B}">
-              <ma14:wrappingTextBoxFlag xmlns:ma14="http://schemas.microsoft.com/office/mac/drawingml/2011/main" xmlns:a14="http://schemas.microsoft.com/office/drawing/2010/main" xmlns:m="http://schemas.openxmlformats.org/officeDocument/2006/math" xmlns="" val="1"/>
+              <ma14:wrappingTextBoxFlag xmlns="" xmlns:m="http://schemas.openxmlformats.org/officeDocument/2006/math" xmlns:a14="http://schemas.microsoft.com/office/drawing/2010/main" xmlns:ma14="http://schemas.microsoft.com/office/mac/drawingml/2011/main" val="1"/>
             </a:ext>
           </a:extLst>
         </p:spPr>
@@ -7103,7 +7452,7 @@
           </a:ln>
           <a:extLst>
             <a:ext uri="{C572A759-6A51-4108-AA02-DFA0A04FC94B}">
-              <ma14:wrappingTextBoxFlag xmlns:ma14="http://schemas.microsoft.com/office/mac/drawingml/2011/main" xmlns:a14="http://schemas.microsoft.com/office/drawing/2010/main" xmlns:m="http://schemas.openxmlformats.org/officeDocument/2006/math" xmlns="" val="1"/>
+              <ma14:wrappingTextBoxFlag xmlns="" xmlns:m="http://schemas.openxmlformats.org/officeDocument/2006/math" xmlns:a14="http://schemas.microsoft.com/office/drawing/2010/main" xmlns:ma14="http://schemas.microsoft.com/office/mac/drawingml/2011/main" val="1"/>
             </a:ext>
           </a:extLst>
         </p:spPr>
@@ -7200,7 +7549,7 @@
           </a:ln>
           <a:extLst>
             <a:ext uri="{C572A759-6A51-4108-AA02-DFA0A04FC94B}">
-              <ma14:wrappingTextBoxFlag xmlns:ma14="http://schemas.microsoft.com/office/mac/drawingml/2011/main" xmlns:a14="http://schemas.microsoft.com/office/drawing/2010/main" xmlns:m="http://schemas.openxmlformats.org/officeDocument/2006/math" xmlns="" val="1"/>
+              <ma14:wrappingTextBoxFlag xmlns="" xmlns:m="http://schemas.openxmlformats.org/officeDocument/2006/math" xmlns:a14="http://schemas.microsoft.com/office/drawing/2010/main" xmlns:ma14="http://schemas.microsoft.com/office/mac/drawingml/2011/main" val="1"/>
             </a:ext>
           </a:extLst>
         </p:spPr>
@@ -7265,7 +7614,7 @@
           </a:ln>
           <a:extLst>
             <a:ext uri="{C572A759-6A51-4108-AA02-DFA0A04FC94B}">
-              <ma14:wrappingTextBoxFlag xmlns:ma14="http://schemas.microsoft.com/office/mac/drawingml/2011/main" xmlns:a14="http://schemas.microsoft.com/office/drawing/2010/main" xmlns:m="http://schemas.openxmlformats.org/officeDocument/2006/math" xmlns="" val="1"/>
+              <ma14:wrappingTextBoxFlag xmlns="" xmlns:m="http://schemas.openxmlformats.org/officeDocument/2006/math" xmlns:a14="http://schemas.microsoft.com/office/drawing/2010/main" xmlns:ma14="http://schemas.microsoft.com/office/mac/drawingml/2011/main" val="1"/>
             </a:ext>
           </a:extLst>
         </p:spPr>
@@ -7427,7 +7776,7 @@
           </a:ln>
           <a:extLst>
             <a:ext uri="{C572A759-6A51-4108-AA02-DFA0A04FC94B}">
-              <ma14:wrappingTextBoxFlag xmlns:ma14="http://schemas.microsoft.com/office/mac/drawingml/2011/main" xmlns:a14="http://schemas.microsoft.com/office/drawing/2010/main" xmlns:m="http://schemas.openxmlformats.org/officeDocument/2006/math" xmlns="" val="1"/>
+              <ma14:wrappingTextBoxFlag xmlns="" xmlns:m="http://schemas.openxmlformats.org/officeDocument/2006/math" xmlns:a14="http://schemas.microsoft.com/office/drawing/2010/main" xmlns:ma14="http://schemas.microsoft.com/office/mac/drawingml/2011/main" val="1"/>
             </a:ext>
           </a:extLst>
         </p:spPr>
@@ -7534,7 +7883,7 @@
             <a:effectLst/>
             <a:extLst>
               <a:ext uri="{C572A759-6A51-4108-AA02-DFA0A04FC94B}">
-                <ma14:wrappingTextBoxFlag xmlns:ma14="http://schemas.microsoft.com/office/mac/drawingml/2011/main" xmlns:a14="http://schemas.microsoft.com/office/drawing/2010/main" xmlns:m="http://schemas.openxmlformats.org/officeDocument/2006/math" xmlns="" val="1"/>
+                <ma14:wrappingTextBoxFlag xmlns="" xmlns:m="http://schemas.openxmlformats.org/officeDocument/2006/math" xmlns:a14="http://schemas.microsoft.com/office/drawing/2010/main" xmlns:ma14="http://schemas.microsoft.com/office/mac/drawingml/2011/main" val="1"/>
               </a:ext>
             </a:extLst>
           </p:spPr>
@@ -7625,7 +7974,7 @@
             <a:effectLst/>
             <a:extLst>
               <a:ext uri="{C572A759-6A51-4108-AA02-DFA0A04FC94B}">
-                <ma14:wrappingTextBoxFlag xmlns:ma14="http://schemas.microsoft.com/office/mac/drawingml/2011/main" xmlns:a14="http://schemas.microsoft.com/office/drawing/2010/main" xmlns:m="http://schemas.openxmlformats.org/officeDocument/2006/math" xmlns="" val="1"/>
+                <ma14:wrappingTextBoxFlag xmlns="" xmlns:m="http://schemas.openxmlformats.org/officeDocument/2006/math" xmlns:a14="http://schemas.microsoft.com/office/drawing/2010/main" xmlns:ma14="http://schemas.microsoft.com/office/mac/drawingml/2011/main" val="1"/>
               </a:ext>
             </a:extLst>
           </p:spPr>
@@ -7701,7 +8050,7 @@
             <a:effectLst/>
             <a:extLst>
               <a:ext uri="{C572A759-6A51-4108-AA02-DFA0A04FC94B}">
-                <ma14:wrappingTextBoxFlag xmlns:ma14="http://schemas.microsoft.com/office/mac/drawingml/2011/main" xmlns:a14="http://schemas.microsoft.com/office/drawing/2010/main" xmlns:m="http://schemas.openxmlformats.org/officeDocument/2006/math" xmlns="" val="1"/>
+                <ma14:wrappingTextBoxFlag xmlns="" xmlns:m="http://schemas.openxmlformats.org/officeDocument/2006/math" xmlns:a14="http://schemas.microsoft.com/office/drawing/2010/main" xmlns:ma14="http://schemas.microsoft.com/office/mac/drawingml/2011/main" val="1"/>
               </a:ext>
             </a:extLst>
           </p:spPr>
@@ -7763,7 +8112,7 @@
             <a:effectLst/>
             <a:extLst>
               <a:ext uri="{C572A759-6A51-4108-AA02-DFA0A04FC94B}">
-                <ma14:wrappingTextBoxFlag xmlns:ma14="http://schemas.microsoft.com/office/mac/drawingml/2011/main" xmlns:a14="http://schemas.microsoft.com/office/drawing/2010/main" xmlns:m="http://schemas.openxmlformats.org/officeDocument/2006/math" xmlns="" val="1"/>
+                <ma14:wrappingTextBoxFlag xmlns="" xmlns:m="http://schemas.openxmlformats.org/officeDocument/2006/math" xmlns:a14="http://schemas.microsoft.com/office/drawing/2010/main" xmlns:ma14="http://schemas.microsoft.com/office/mac/drawingml/2011/main" val="1"/>
               </a:ext>
             </a:extLst>
           </p:spPr>
@@ -7854,7 +8203,7 @@
             <a:effectLst/>
             <a:extLst>
               <a:ext uri="{C572A759-6A51-4108-AA02-DFA0A04FC94B}">
-                <ma14:wrappingTextBoxFlag xmlns:ma14="http://schemas.microsoft.com/office/mac/drawingml/2011/main" xmlns:a14="http://schemas.microsoft.com/office/drawing/2010/main" xmlns:m="http://schemas.openxmlformats.org/officeDocument/2006/math" xmlns="" val="1"/>
+                <ma14:wrappingTextBoxFlag xmlns="" xmlns:m="http://schemas.openxmlformats.org/officeDocument/2006/math" xmlns:a14="http://schemas.microsoft.com/office/drawing/2010/main" xmlns:ma14="http://schemas.microsoft.com/office/mac/drawingml/2011/main" val="1"/>
               </a:ext>
             </a:extLst>
           </p:spPr>
@@ -7984,206 +8333,6 @@
 </file>
 
 <file path=ppt/slides/slide18.xml><?xml version="1.0" encoding="utf-8"?>
-<p:sld xmlns:a="http://schemas.openxmlformats.org/drawingml/2006/main" xmlns:r="http://schemas.openxmlformats.org/officeDocument/2006/relationships" xmlns:p="http://schemas.openxmlformats.org/presentationml/2006/main">
-  <p:cSld>
-    <p:spTree>
-      <p:nvGrpSpPr>
-        <p:cNvPr id="1" name=""/>
-        <p:cNvGrpSpPr/>
-        <p:nvPr/>
-      </p:nvGrpSpPr>
-      <p:grpSpPr>
-        <a:xfrm>
-          <a:off x="0" y="0"/>
-          <a:ext cx="0" cy="0"/>
-          <a:chOff x="0" y="0"/>
-          <a:chExt cx="0" cy="0"/>
-        </a:xfrm>
-      </p:grpSpPr>
-      <p:sp>
-        <p:nvSpPr>
-          <p:cNvPr id="181" name="Lijn"/>
-          <p:cNvSpPr/>
-          <p:nvPr/>
-        </p:nvSpPr>
-        <p:spPr>
-          <a:xfrm flipV="1">
-            <a:off x="1936482" y="1459216"/>
-            <a:ext cx="1" cy="6835168"/>
-          </a:xfrm>
-          <a:prstGeom prst="line">
-            <a:avLst/>
-          </a:prstGeom>
-          <a:ln w="25400">
-            <a:solidFill>
-              <a:srgbClr val="000000"/>
-            </a:solidFill>
-            <a:miter lim="400000"/>
-          </a:ln>
-        </p:spPr>
-        <p:txBody>
-          <a:bodyPr lIns="50800" tIns="50800" rIns="50800" bIns="50800" anchor="ctr"/>
-          <a:lstStyle/>
-          <a:p>
-            <a:pPr>
-              <a:defRPr sz="2400"/>
-            </a:pPr>
-            <a:endParaRPr/>
-          </a:p>
-        </p:txBody>
-      </p:sp>
-      <p:sp>
-        <p:nvSpPr>
-          <p:cNvPr id="182" name="Lijn"/>
-          <p:cNvSpPr/>
-          <p:nvPr/>
-        </p:nvSpPr>
-        <p:spPr>
-          <a:xfrm>
-            <a:off x="1071443" y="7761174"/>
-            <a:ext cx="10494179" cy="1"/>
-          </a:xfrm>
-          <a:prstGeom prst="line">
-            <a:avLst/>
-          </a:prstGeom>
-          <a:ln w="25400">
-            <a:solidFill>
-              <a:srgbClr val="000000"/>
-            </a:solidFill>
-            <a:miter lim="400000"/>
-          </a:ln>
-        </p:spPr>
-        <p:txBody>
-          <a:bodyPr lIns="50800" tIns="50800" rIns="50800" bIns="50800" anchor="ctr"/>
-          <a:lstStyle/>
-          <a:p>
-            <a:pPr>
-              <a:defRPr sz="2400"/>
-            </a:pPr>
-            <a:endParaRPr/>
-          </a:p>
-        </p:txBody>
-      </p:sp>
-      <p:sp>
-        <p:nvSpPr>
-          <p:cNvPr id="183" name="error →"/>
-          <p:cNvSpPr txBox="1"/>
-          <p:nvPr/>
-        </p:nvSpPr>
-        <p:spPr>
-          <a:xfrm rot="16200000">
-            <a:off x="410192" y="4006965"/>
-            <a:ext cx="1717626" cy="665560"/>
-          </a:xfrm>
-          <a:prstGeom prst="rect">
-            <a:avLst/>
-          </a:prstGeom>
-          <a:ln w="12700">
-            <a:miter lim="400000"/>
-          </a:ln>
-          <a:extLst>
-            <a:ext uri="{C572A759-6A51-4108-AA02-DFA0A04FC94B}">
-              <ma14:wrappingTextBoxFlag xmlns:ma14="http://schemas.microsoft.com/office/mac/drawingml/2011/main" xmlns:a14="http://schemas.microsoft.com/office/drawing/2010/main" xmlns:m="http://schemas.openxmlformats.org/officeDocument/2006/math" xmlns="" val="1"/>
-            </a:ext>
-          </a:extLst>
-        </p:spPr>
-        <p:txBody>
-          <a:bodyPr wrap="none" lIns="50800" tIns="50800" rIns="50800" bIns="50800" anchor="ctr">
-            <a:spAutoFit/>
-          </a:bodyPr>
-          <a:lstStyle/>
-          <a:p>
-            <a:pPr>
-              <a:defRPr>
-                <a:latin typeface="Calibri"/>
-                <a:ea typeface="Calibri"/>
-                <a:cs typeface="Calibri"/>
-                <a:sym typeface="Calibri"/>
-              </a:defRPr>
-            </a:pPr>
-            <a:r>
-              <a:t>error </a:t>
-            </a:r>
-            <a:r>
-              <a:rPr>
-                <a:latin typeface="Helvetica"/>
-                <a:ea typeface="Helvetica"/>
-                <a:cs typeface="Helvetica"/>
-                <a:sym typeface="Helvetica"/>
-              </a:rPr>
-              <a:t>→</a:t>
-            </a:r>
-            <a:r>
-              <a:t> </a:t>
-            </a:r>
-          </a:p>
-        </p:txBody>
-      </p:sp>
-      <p:sp>
-        <p:nvSpPr>
-          <p:cNvPr id="184" name="degree →"/>
-          <p:cNvSpPr txBox="1"/>
-          <p:nvPr/>
-        </p:nvSpPr>
-        <p:spPr>
-          <a:xfrm>
-            <a:off x="5467672" y="8218662"/>
-            <a:ext cx="2069456" cy="665561"/>
-          </a:xfrm>
-          <a:prstGeom prst="rect">
-            <a:avLst/>
-          </a:prstGeom>
-          <a:ln w="12700">
-            <a:miter lim="400000"/>
-          </a:ln>
-          <a:extLst>
-            <a:ext uri="{C572A759-6A51-4108-AA02-DFA0A04FC94B}">
-              <ma14:wrappingTextBoxFlag xmlns:ma14="http://schemas.microsoft.com/office/mac/drawingml/2011/main" xmlns:a14="http://schemas.microsoft.com/office/drawing/2010/main" xmlns:m="http://schemas.openxmlformats.org/officeDocument/2006/math" xmlns="" val="1"/>
-            </a:ext>
-          </a:extLst>
-        </p:spPr>
-        <p:txBody>
-          <a:bodyPr wrap="none" lIns="50800" tIns="50800" rIns="50800" bIns="50800" anchor="ctr">
-            <a:spAutoFit/>
-          </a:bodyPr>
-          <a:lstStyle/>
-          <a:p>
-            <a:pPr>
-              <a:defRPr>
-                <a:latin typeface="Calibri"/>
-                <a:ea typeface="Calibri"/>
-                <a:cs typeface="Calibri"/>
-                <a:sym typeface="Calibri"/>
-              </a:defRPr>
-            </a:pPr>
-            <a:r>
-              <a:t>degree </a:t>
-            </a:r>
-            <a:r>
-              <a:rPr>
-                <a:latin typeface="Helvetica"/>
-                <a:ea typeface="Helvetica"/>
-                <a:cs typeface="Helvetica"/>
-                <a:sym typeface="Helvetica"/>
-              </a:rPr>
-              <a:t>→</a:t>
-            </a:r>
-            <a:r>
-              <a:t> </a:t>
-            </a:r>
-          </a:p>
-        </p:txBody>
-      </p:sp>
-    </p:spTree>
-  </p:cSld>
-  <p:clrMapOvr>
-    <a:masterClrMapping/>
-  </p:clrMapOvr>
-  <p:transition spd="med"/>
-</p:sld>
-</file>
-
-<file path=ppt/slides/slide19.xml><?xml version="1.0" encoding="utf-8"?>
 <p:sld xmlns:a="http://schemas.openxmlformats.org/drawingml/2006/main" xmlns:r="http://schemas.openxmlformats.org/officeDocument/2006/relationships" xmlns:p="http://schemas.openxmlformats.org/presentationml/2006/main" show="0">
   <p:cSld>
     <p:spTree>
@@ -8236,6 +8385,76 @@
 </p:sld>
 </file>
 
+<file path=ppt/slides/slide19.xml><?xml version="1.0" encoding="utf-8"?>
+<p:sld xmlns:a="http://schemas.openxmlformats.org/drawingml/2006/main" xmlns:r="http://schemas.openxmlformats.org/officeDocument/2006/relationships" xmlns:p="http://schemas.openxmlformats.org/presentationml/2006/main">
+  <p:cSld>
+    <p:spTree>
+      <p:nvGrpSpPr>
+        <p:cNvPr id="1" name=""/>
+        <p:cNvGrpSpPr/>
+        <p:nvPr/>
+      </p:nvGrpSpPr>
+      <p:grpSpPr>
+        <a:xfrm>
+          <a:off x="0" y="0"/>
+          <a:ext cx="0" cy="0"/>
+          <a:chOff x="0" y="0"/>
+          <a:chExt cx="0" cy="0"/>
+        </a:xfrm>
+      </p:grpSpPr>
+      <p:sp>
+        <p:nvSpPr>
+          <p:cNvPr id="188" name="ml:confusion matrix"/>
+          <p:cNvSpPr txBox="1"/>
+          <p:nvPr/>
+        </p:nvSpPr>
+        <p:spPr>
+          <a:xfrm>
+            <a:off x="1215355" y="4292599"/>
+            <a:ext cx="10574090" cy="1168401"/>
+          </a:xfrm>
+          <a:prstGeom prst="rect">
+            <a:avLst/>
+          </a:prstGeom>
+          <a:ln w="12700">
+            <a:miter lim="400000"/>
+          </a:ln>
+          <a:extLst>
+            <a:ext uri="{C572A759-6A51-4108-AA02-DFA0A04FC94B}">
+              <ma14:wrappingTextBoxFlag xmlns="" xmlns:m="http://schemas.openxmlformats.org/officeDocument/2006/math" xmlns:a14="http://schemas.microsoft.com/office/drawing/2010/main" xmlns:ma14="http://schemas.microsoft.com/office/mac/drawingml/2011/main" val="1"/>
+            </a:ext>
+          </a:extLst>
+        </p:spPr>
+        <p:txBody>
+          <a:bodyPr wrap="none" lIns="50800" tIns="50800" rIns="50800" bIns="50800" anchor="ctr">
+            <a:spAutoFit/>
+          </a:bodyPr>
+          <a:lstStyle>
+            <a:lvl1pPr>
+              <a:defRPr sz="7200">
+                <a:latin typeface="Menlo Regular"/>
+                <a:ea typeface="Menlo Regular"/>
+                <a:cs typeface="Menlo Regular"/>
+                <a:sym typeface="Menlo Regular"/>
+              </a:defRPr>
+            </a:lvl1pPr>
+          </a:lstStyle>
+          <a:p>
+            <a:r>
+              <a:t>ml:confusion matrix</a:t>
+            </a:r>
+          </a:p>
+        </p:txBody>
+      </p:sp>
+    </p:spTree>
+  </p:cSld>
+  <p:clrMapOvr>
+    <a:masterClrMapping/>
+  </p:clrMapOvr>
+  <p:transition spd="med"/>
+</p:sld>
+</file>
+
 <file path=ppt/slides/slide2.xml><?xml version="1.0" encoding="utf-8"?>
 <p:sld xmlns:a="http://schemas.openxmlformats.org/drawingml/2006/main" xmlns:r="http://schemas.openxmlformats.org/officeDocument/2006/relationships" xmlns:p="http://schemas.openxmlformats.org/presentationml/2006/main">
   <p:cSld>
@@ -8272,7 +8491,7 @@
           </a:ln>
           <a:extLst>
             <a:ext uri="{C572A759-6A51-4108-AA02-DFA0A04FC94B}">
-              <ma14:wrappingTextBoxFlag xmlns:ma14="http://schemas.microsoft.com/office/mac/drawingml/2011/main" xmlns:a14="http://schemas.microsoft.com/office/drawing/2010/main" xmlns:m="http://schemas.openxmlformats.org/officeDocument/2006/math" xmlns="" val="1"/>
+              <ma14:wrappingTextBoxFlag xmlns="" xmlns:m="http://schemas.openxmlformats.org/officeDocument/2006/math" xmlns:a14="http://schemas.microsoft.com/office/drawing/2010/main" xmlns:ma14="http://schemas.microsoft.com/office/mac/drawingml/2011/main" val="1"/>
             </a:ext>
           </a:extLst>
         </p:spPr>
@@ -8307,76 +8526,6 @@
 </file>
 
 <file path=ppt/slides/slide20.xml><?xml version="1.0" encoding="utf-8"?>
-<p:sld xmlns:a="http://schemas.openxmlformats.org/drawingml/2006/main" xmlns:r="http://schemas.openxmlformats.org/officeDocument/2006/relationships" xmlns:p="http://schemas.openxmlformats.org/presentationml/2006/main">
-  <p:cSld>
-    <p:spTree>
-      <p:nvGrpSpPr>
-        <p:cNvPr id="1" name=""/>
-        <p:cNvGrpSpPr/>
-        <p:nvPr/>
-      </p:nvGrpSpPr>
-      <p:grpSpPr>
-        <a:xfrm>
-          <a:off x="0" y="0"/>
-          <a:ext cx="0" cy="0"/>
-          <a:chOff x="0" y="0"/>
-          <a:chExt cx="0" cy="0"/>
-        </a:xfrm>
-      </p:grpSpPr>
-      <p:sp>
-        <p:nvSpPr>
-          <p:cNvPr id="188" name="ml:confusion matrix"/>
-          <p:cNvSpPr txBox="1"/>
-          <p:nvPr/>
-        </p:nvSpPr>
-        <p:spPr>
-          <a:xfrm>
-            <a:off x="1215355" y="4292599"/>
-            <a:ext cx="10574090" cy="1168401"/>
-          </a:xfrm>
-          <a:prstGeom prst="rect">
-            <a:avLst/>
-          </a:prstGeom>
-          <a:ln w="12700">
-            <a:miter lim="400000"/>
-          </a:ln>
-          <a:extLst>
-            <a:ext uri="{C572A759-6A51-4108-AA02-DFA0A04FC94B}">
-              <ma14:wrappingTextBoxFlag xmlns:ma14="http://schemas.microsoft.com/office/mac/drawingml/2011/main" xmlns:a14="http://schemas.microsoft.com/office/drawing/2010/main" xmlns:m="http://schemas.openxmlformats.org/officeDocument/2006/math" xmlns="" val="1"/>
-            </a:ext>
-          </a:extLst>
-        </p:spPr>
-        <p:txBody>
-          <a:bodyPr wrap="none" lIns="50800" tIns="50800" rIns="50800" bIns="50800" anchor="ctr">
-            <a:spAutoFit/>
-          </a:bodyPr>
-          <a:lstStyle>
-            <a:lvl1pPr>
-              <a:defRPr sz="7200">
-                <a:latin typeface="Menlo Regular"/>
-                <a:ea typeface="Menlo Regular"/>
-                <a:cs typeface="Menlo Regular"/>
-                <a:sym typeface="Menlo Regular"/>
-              </a:defRPr>
-            </a:lvl1pPr>
-          </a:lstStyle>
-          <a:p>
-            <a:r>
-              <a:t>ml:confusion matrix</a:t>
-            </a:r>
-          </a:p>
-        </p:txBody>
-      </p:sp>
-    </p:spTree>
-  </p:cSld>
-  <p:clrMapOvr>
-    <a:masterClrMapping/>
-  </p:clrMapOvr>
-  <p:transition spd="med"/>
-</p:sld>
-</file>
-
-<file path=ppt/slides/slide21.xml><?xml version="1.0" encoding="utf-8"?>
 <p:sld xmlns:a="http://schemas.openxmlformats.org/drawingml/2006/main" xmlns:r="http://schemas.openxmlformats.org/officeDocument/2006/relationships" xmlns:p="http://schemas.openxmlformats.org/presentationml/2006/main">
   <p:cSld>
     <p:spTree>
@@ -8474,7 +8623,7 @@
             <a:effectLst/>
             <a:extLst>
               <a:ext uri="{C572A759-6A51-4108-AA02-DFA0A04FC94B}">
-                <ma14:wrappingTextBoxFlag xmlns:ma14="http://schemas.microsoft.com/office/mac/drawingml/2011/main" xmlns:a14="http://schemas.microsoft.com/office/drawing/2010/main" xmlns:m="http://schemas.openxmlformats.org/officeDocument/2006/math" xmlns="" val="1"/>
+                <ma14:wrappingTextBoxFlag xmlns="" xmlns:m="http://schemas.openxmlformats.org/officeDocument/2006/math" xmlns:a14="http://schemas.microsoft.com/office/drawing/2010/main" xmlns:ma14="http://schemas.microsoft.com/office/mac/drawingml/2011/main" val="1"/>
               </a:ext>
             </a:extLst>
           </p:spPr>
@@ -8584,7 +8733,7 @@
             <a:effectLst/>
             <a:extLst>
               <a:ext uri="{C572A759-6A51-4108-AA02-DFA0A04FC94B}">
-                <ma14:wrappingTextBoxFlag xmlns:ma14="http://schemas.microsoft.com/office/mac/drawingml/2011/main" xmlns:a14="http://schemas.microsoft.com/office/drawing/2010/main" xmlns:m="http://schemas.openxmlformats.org/officeDocument/2006/math" xmlns="" val="1"/>
+                <ma14:wrappingTextBoxFlag xmlns="" xmlns:m="http://schemas.openxmlformats.org/officeDocument/2006/math" xmlns:a14="http://schemas.microsoft.com/office/drawing/2010/main" xmlns:ma14="http://schemas.microsoft.com/office/mac/drawingml/2011/main" val="1"/>
               </a:ext>
             </a:extLst>
           </p:spPr>
@@ -8694,7 +8843,7 @@
             <a:effectLst/>
             <a:extLst>
               <a:ext uri="{C572A759-6A51-4108-AA02-DFA0A04FC94B}">
-                <ma14:wrappingTextBoxFlag xmlns:ma14="http://schemas.microsoft.com/office/mac/drawingml/2011/main" xmlns:a14="http://schemas.microsoft.com/office/drawing/2010/main" xmlns:m="http://schemas.openxmlformats.org/officeDocument/2006/math" xmlns="" val="1"/>
+                <ma14:wrappingTextBoxFlag xmlns="" xmlns:m="http://schemas.openxmlformats.org/officeDocument/2006/math" xmlns:a14="http://schemas.microsoft.com/office/drawing/2010/main" xmlns:ma14="http://schemas.microsoft.com/office/mac/drawingml/2011/main" val="1"/>
               </a:ext>
             </a:extLst>
           </p:spPr>
@@ -8812,7 +8961,7 @@
           </a:ln>
           <a:extLst>
             <a:ext uri="{C572A759-6A51-4108-AA02-DFA0A04FC94B}">
-              <ma14:wrappingTextBoxFlag xmlns:ma14="http://schemas.microsoft.com/office/mac/drawingml/2011/main" xmlns:a14="http://schemas.microsoft.com/office/drawing/2010/main" xmlns:m="http://schemas.openxmlformats.org/officeDocument/2006/math" xmlns="" val="1"/>
+              <ma14:wrappingTextBoxFlag xmlns="" xmlns:m="http://schemas.openxmlformats.org/officeDocument/2006/math" xmlns:a14="http://schemas.microsoft.com/office/drawing/2010/main" xmlns:ma14="http://schemas.microsoft.com/office/mac/drawingml/2011/main" val="1"/>
             </a:ext>
           </a:extLst>
         </p:spPr>
@@ -8859,7 +9008,7 @@
           </a:ln>
           <a:extLst>
             <a:ext uri="{C572A759-6A51-4108-AA02-DFA0A04FC94B}">
-              <ma14:wrappingTextBoxFlag xmlns:ma14="http://schemas.microsoft.com/office/mac/drawingml/2011/main" xmlns:a14="http://schemas.microsoft.com/office/drawing/2010/main" xmlns:m="http://schemas.openxmlformats.org/officeDocument/2006/math" xmlns="" val="1"/>
+              <ma14:wrappingTextBoxFlag xmlns="" xmlns:m="http://schemas.openxmlformats.org/officeDocument/2006/math" xmlns:a14="http://schemas.microsoft.com/office/drawing/2010/main" xmlns:ma14="http://schemas.microsoft.com/office/mac/drawingml/2011/main" val="1"/>
             </a:ext>
           </a:extLst>
         </p:spPr>
@@ -8906,7 +9055,7 @@
           </a:ln>
           <a:extLst>
             <a:ext uri="{C572A759-6A51-4108-AA02-DFA0A04FC94B}">
-              <ma14:wrappingTextBoxFlag xmlns:ma14="http://schemas.microsoft.com/office/mac/drawingml/2011/main" xmlns:a14="http://schemas.microsoft.com/office/drawing/2010/main" xmlns:m="http://schemas.openxmlformats.org/officeDocument/2006/math" xmlns="" val="1"/>
+              <ma14:wrappingTextBoxFlag xmlns="" xmlns:m="http://schemas.openxmlformats.org/officeDocument/2006/math" xmlns:a14="http://schemas.microsoft.com/office/drawing/2010/main" xmlns:ma14="http://schemas.microsoft.com/office/mac/drawingml/2011/main" val="1"/>
             </a:ext>
           </a:extLst>
         </p:spPr>
@@ -9014,7 +9163,7 @@
             <a:effectLst/>
             <a:extLst>
               <a:ext uri="{C572A759-6A51-4108-AA02-DFA0A04FC94B}">
-                <ma14:wrappingTextBoxFlag xmlns:ma14="http://schemas.microsoft.com/office/mac/drawingml/2011/main" xmlns:a14="http://schemas.microsoft.com/office/drawing/2010/main" xmlns:m="http://schemas.openxmlformats.org/officeDocument/2006/math" xmlns="" val="1"/>
+                <ma14:wrappingTextBoxFlag xmlns="" xmlns:m="http://schemas.openxmlformats.org/officeDocument/2006/math" xmlns:a14="http://schemas.microsoft.com/office/drawing/2010/main" xmlns:ma14="http://schemas.microsoft.com/office/mac/drawingml/2011/main" val="1"/>
               </a:ext>
             </a:extLst>
           </p:spPr>
@@ -9052,7 +9201,7 @@
 </p:sld>
 </file>
 
-<file path=ppt/slides/slide22.xml><?xml version="1.0" encoding="utf-8"?>
+<file path=ppt/slides/slide21.xml><?xml version="1.0" encoding="utf-8"?>
 <p:sld xmlns:a="http://schemas.openxmlformats.org/drawingml/2006/main" xmlns:r="http://schemas.openxmlformats.org/officeDocument/2006/relationships" xmlns:p="http://schemas.openxmlformats.org/presentationml/2006/main">
   <p:cSld>
     <p:spTree>
@@ -9158,7 +9307,7 @@
           </a:ln>
           <a:extLst>
             <a:ext uri="{C572A759-6A51-4108-AA02-DFA0A04FC94B}">
-              <ma14:wrappingTextBoxFlag xmlns:ma14="http://schemas.microsoft.com/office/mac/drawingml/2011/main" xmlns:a14="http://schemas.microsoft.com/office/drawing/2010/main" xmlns:m="http://schemas.openxmlformats.org/officeDocument/2006/math" xmlns="" val="1"/>
+              <ma14:wrappingTextBoxFlag xmlns="" xmlns:m="http://schemas.openxmlformats.org/officeDocument/2006/math" xmlns:a14="http://schemas.microsoft.com/office/drawing/2010/main" xmlns:ma14="http://schemas.microsoft.com/office/mac/drawingml/2011/main" val="1"/>
             </a:ext>
           </a:extLst>
         </p:spPr>
@@ -9205,7 +9354,7 @@
           </a:ln>
           <a:extLst>
             <a:ext uri="{C572A759-6A51-4108-AA02-DFA0A04FC94B}">
-              <ma14:wrappingTextBoxFlag xmlns:ma14="http://schemas.microsoft.com/office/mac/drawingml/2011/main" xmlns:a14="http://schemas.microsoft.com/office/drawing/2010/main" xmlns:m="http://schemas.openxmlformats.org/officeDocument/2006/math" xmlns="" val="1"/>
+              <ma14:wrappingTextBoxFlag xmlns="" xmlns:m="http://schemas.openxmlformats.org/officeDocument/2006/math" xmlns:a14="http://schemas.microsoft.com/office/drawing/2010/main" xmlns:ma14="http://schemas.microsoft.com/office/mac/drawingml/2011/main" val="1"/>
             </a:ext>
           </a:extLst>
         </p:spPr>
@@ -9252,7 +9401,7 @@
           </a:ln>
           <a:extLst>
             <a:ext uri="{C572A759-6A51-4108-AA02-DFA0A04FC94B}">
-              <ma14:wrappingTextBoxFlag xmlns:ma14="http://schemas.microsoft.com/office/mac/drawingml/2011/main" xmlns:a14="http://schemas.microsoft.com/office/drawing/2010/main" xmlns:m="http://schemas.openxmlformats.org/officeDocument/2006/math" xmlns="" val="1"/>
+              <ma14:wrappingTextBoxFlag xmlns="" xmlns:m="http://schemas.openxmlformats.org/officeDocument/2006/math" xmlns:a14="http://schemas.microsoft.com/office/drawing/2010/main" xmlns:ma14="http://schemas.microsoft.com/office/mac/drawingml/2011/main" val="1"/>
             </a:ext>
           </a:extLst>
         </p:spPr>
@@ -9308,7 +9457,7 @@
           </a:ln>
           <a:extLst>
             <a:ext uri="{C572A759-6A51-4108-AA02-DFA0A04FC94B}">
-              <ma14:wrappingTextBoxFlag xmlns:ma14="http://schemas.microsoft.com/office/mac/drawingml/2011/main" xmlns:a14="http://schemas.microsoft.com/office/drawing/2010/main" xmlns:m="http://schemas.openxmlformats.org/officeDocument/2006/math" xmlns="" val="1"/>
+              <ma14:wrappingTextBoxFlag xmlns="" xmlns:m="http://schemas.openxmlformats.org/officeDocument/2006/math" xmlns:a14="http://schemas.microsoft.com/office/drawing/2010/main" xmlns:ma14="http://schemas.microsoft.com/office/mac/drawingml/2011/main" val="1"/>
             </a:ext>
           </a:extLst>
         </p:spPr>
@@ -9364,7 +9513,7 @@
           </a:ln>
           <a:extLst>
             <a:ext uri="{C572A759-6A51-4108-AA02-DFA0A04FC94B}">
-              <ma14:wrappingTextBoxFlag xmlns:ma14="http://schemas.microsoft.com/office/mac/drawingml/2011/main" xmlns:a14="http://schemas.microsoft.com/office/drawing/2010/main" xmlns:m="http://schemas.openxmlformats.org/officeDocument/2006/math" xmlns="" val="1"/>
+              <ma14:wrappingTextBoxFlag xmlns="" xmlns:m="http://schemas.openxmlformats.org/officeDocument/2006/math" xmlns:a14="http://schemas.microsoft.com/office/drawing/2010/main" xmlns:ma14="http://schemas.microsoft.com/office/mac/drawingml/2011/main" val="1"/>
             </a:ext>
           </a:extLst>
         </p:spPr>
@@ -9420,7 +9569,7 @@
           </a:ln>
           <a:extLst>
             <a:ext uri="{C572A759-6A51-4108-AA02-DFA0A04FC94B}">
-              <ma14:wrappingTextBoxFlag xmlns:ma14="http://schemas.microsoft.com/office/mac/drawingml/2011/main" xmlns:a14="http://schemas.microsoft.com/office/drawing/2010/main" xmlns:m="http://schemas.openxmlformats.org/officeDocument/2006/math" xmlns="" val="1"/>
+              <ma14:wrappingTextBoxFlag xmlns="" xmlns:m="http://schemas.openxmlformats.org/officeDocument/2006/math" xmlns:a14="http://schemas.microsoft.com/office/drawing/2010/main" xmlns:ma14="http://schemas.microsoft.com/office/mac/drawingml/2011/main" val="1"/>
             </a:ext>
           </a:extLst>
         </p:spPr>
@@ -9790,7 +9939,7 @@
 </p:sld>
 </file>
 
-<file path=ppt/slides/slide23.xml><?xml version="1.0" encoding="utf-8"?>
+<file path=ppt/slides/slide22.xml><?xml version="1.0" encoding="utf-8"?>
 <p:sld xmlns:a="http://schemas.openxmlformats.org/drawingml/2006/main" xmlns:r="http://schemas.openxmlformats.org/officeDocument/2006/relationships" xmlns:p="http://schemas.openxmlformats.org/presentationml/2006/main">
   <p:cSld>
     <p:spTree>
@@ -13398,7 +13547,7 @@
           </a:ln>
           <a:extLst>
             <a:ext uri="{C572A759-6A51-4108-AA02-DFA0A04FC94B}">
-              <ma14:wrappingTextBoxFlag xmlns:ma14="http://schemas.microsoft.com/office/mac/drawingml/2011/main" xmlns:a14="http://schemas.microsoft.com/office/drawing/2010/main" xmlns:m="http://schemas.openxmlformats.org/officeDocument/2006/math" xmlns="" val="1"/>
+              <ma14:wrappingTextBoxFlag xmlns="" xmlns:m="http://schemas.openxmlformats.org/officeDocument/2006/math" xmlns:a14="http://schemas.microsoft.com/office/drawing/2010/main" xmlns:ma14="http://schemas.microsoft.com/office/mac/drawingml/2011/main" val="1"/>
             </a:ext>
           </a:extLst>
         </p:spPr>
@@ -13445,7 +13594,7 @@
           </a:ln>
           <a:extLst>
             <a:ext uri="{C572A759-6A51-4108-AA02-DFA0A04FC94B}">
-              <ma14:wrappingTextBoxFlag xmlns:ma14="http://schemas.microsoft.com/office/mac/drawingml/2011/main" xmlns:a14="http://schemas.microsoft.com/office/drawing/2010/main" xmlns:m="http://schemas.openxmlformats.org/officeDocument/2006/math" xmlns="" val="1"/>
+              <ma14:wrappingTextBoxFlag xmlns="" xmlns:m="http://schemas.openxmlformats.org/officeDocument/2006/math" xmlns:a14="http://schemas.microsoft.com/office/drawing/2010/main" xmlns:ma14="http://schemas.microsoft.com/office/mac/drawingml/2011/main" val="1"/>
             </a:ext>
           </a:extLst>
         </p:spPr>
@@ -13492,7 +13641,7 @@
           </a:ln>
           <a:extLst>
             <a:ext uri="{C572A759-6A51-4108-AA02-DFA0A04FC94B}">
-              <ma14:wrappingTextBoxFlag xmlns:ma14="http://schemas.microsoft.com/office/mac/drawingml/2011/main" xmlns:a14="http://schemas.microsoft.com/office/drawing/2010/main" xmlns:m="http://schemas.openxmlformats.org/officeDocument/2006/math" xmlns="" val="1"/>
+              <ma14:wrappingTextBoxFlag xmlns="" xmlns:m="http://schemas.openxmlformats.org/officeDocument/2006/math" xmlns:a14="http://schemas.microsoft.com/office/drawing/2010/main" xmlns:ma14="http://schemas.microsoft.com/office/mac/drawingml/2011/main" val="1"/>
             </a:ext>
           </a:extLst>
         </p:spPr>
@@ -14573,7 +14722,7 @@
             <a:effectLst/>
             <a:extLst>
               <a:ext uri="{C572A759-6A51-4108-AA02-DFA0A04FC94B}">
-                <ma14:wrappingTextBoxFlag xmlns:ma14="http://schemas.microsoft.com/office/mac/drawingml/2011/main" xmlns:a14="http://schemas.microsoft.com/office/drawing/2010/main" xmlns:m="http://schemas.openxmlformats.org/officeDocument/2006/math" xmlns="" val="1"/>
+                <ma14:wrappingTextBoxFlag xmlns="" xmlns:m="http://schemas.openxmlformats.org/officeDocument/2006/math" xmlns:a14="http://schemas.microsoft.com/office/drawing/2010/main" xmlns:ma14="http://schemas.microsoft.com/office/mac/drawingml/2011/main" val="1"/>
               </a:ext>
             </a:extLst>
           </p:spPr>
@@ -14698,7 +14847,7 @@
             <a:effectLst/>
             <a:extLst>
               <a:ext uri="{C572A759-6A51-4108-AA02-DFA0A04FC94B}">
-                <ma14:wrappingTextBoxFlag xmlns:ma14="http://schemas.microsoft.com/office/mac/drawingml/2011/main" xmlns:a14="http://schemas.microsoft.com/office/drawing/2010/main" xmlns:m="http://schemas.openxmlformats.org/officeDocument/2006/math" xmlns="" val="1"/>
+                <ma14:wrappingTextBoxFlag xmlns="" xmlns:m="http://schemas.openxmlformats.org/officeDocument/2006/math" xmlns:a14="http://schemas.microsoft.com/office/drawing/2010/main" xmlns:ma14="http://schemas.microsoft.com/office/mac/drawingml/2011/main" val="1"/>
               </a:ext>
             </a:extLst>
           </p:spPr>
@@ -14823,7 +14972,7 @@
             <a:effectLst/>
             <a:extLst>
               <a:ext uri="{C572A759-6A51-4108-AA02-DFA0A04FC94B}">
-                <ma14:wrappingTextBoxFlag xmlns:ma14="http://schemas.microsoft.com/office/mac/drawingml/2011/main" xmlns:a14="http://schemas.microsoft.com/office/drawing/2010/main" xmlns:m="http://schemas.openxmlformats.org/officeDocument/2006/math" xmlns="" val="1"/>
+                <ma14:wrappingTextBoxFlag xmlns="" xmlns:m="http://schemas.openxmlformats.org/officeDocument/2006/math" xmlns:a14="http://schemas.microsoft.com/office/drawing/2010/main" xmlns:ma14="http://schemas.microsoft.com/office/mac/drawingml/2011/main" val="1"/>
               </a:ext>
             </a:extLst>
           </p:spPr>
@@ -14947,7 +15096,7 @@
             <a:effectLst/>
             <a:extLst>
               <a:ext uri="{C572A759-6A51-4108-AA02-DFA0A04FC94B}">
-                <ma14:wrappingTextBoxFlag xmlns:ma14="http://schemas.microsoft.com/office/mac/drawingml/2011/main" xmlns:a14="http://schemas.microsoft.com/office/drawing/2010/main" xmlns:m="http://schemas.openxmlformats.org/officeDocument/2006/math" xmlns="" val="1"/>
+                <ma14:wrappingTextBoxFlag xmlns="" xmlns:m="http://schemas.openxmlformats.org/officeDocument/2006/math" xmlns:a14="http://schemas.microsoft.com/office/drawing/2010/main" xmlns:ma14="http://schemas.microsoft.com/office/mac/drawingml/2011/main" val="1"/>
               </a:ext>
             </a:extLst>
           </p:spPr>
@@ -15000,7 +15149,7 @@
 </p:sld>
 </file>
 
-<file path=ppt/slides/slide24.xml><?xml version="1.0" encoding="utf-8"?>
+<file path=ppt/slides/slide23.xml><?xml version="1.0" encoding="utf-8"?>
 <p:sld xmlns:a="http://schemas.openxmlformats.org/drawingml/2006/main" xmlns:r="http://schemas.openxmlformats.org/officeDocument/2006/relationships" xmlns:p="http://schemas.openxmlformats.org/presentationml/2006/main">
   <p:cSld>
     <p:spTree>
@@ -15248,7 +15397,7 @@
                 <a:avLst/>
               </a:prstGeom>
               <a:blipFill>
-                <a:blip r:embed="rId2"/>
+                <a:blip r:embed="rId3"/>
                 <a:stretch>
                   <a:fillRect l="-147" r="-9238" b="-5294"/>
                 </a:stretch>
@@ -15291,7 +15440,7 @@
           </a:ln>
           <a:extLst>
             <a:ext uri="{C572A759-6A51-4108-AA02-DFA0A04FC94B}">
-              <ma14:wrappingTextBoxFlag xmlns:ma14="http://schemas.microsoft.com/office/mac/drawingml/2011/main" xmlns:a14="http://schemas.microsoft.com/office/drawing/2010/main" xmlns:m="http://schemas.openxmlformats.org/officeDocument/2006/math" xmlns="" val="1"/>
+              <ma14:wrappingTextBoxFlag xmlns="" xmlns:m="http://schemas.openxmlformats.org/officeDocument/2006/math" xmlns:a14="http://schemas.microsoft.com/office/drawing/2010/main" xmlns:ma14="http://schemas.microsoft.com/office/mac/drawingml/2011/main" val="1"/>
             </a:ext>
           </a:extLst>
         </p:spPr>
@@ -15325,7 +15474,7 @@
 </p:sld>
 </file>
 
-<file path=ppt/slides/slide25.xml><?xml version="1.0" encoding="utf-8"?>
+<file path=ppt/slides/slide24.xml><?xml version="1.0" encoding="utf-8"?>
 <p:sld xmlns:a="http://schemas.openxmlformats.org/drawingml/2006/main" xmlns:r="http://schemas.openxmlformats.org/officeDocument/2006/relationships" xmlns:p="http://schemas.openxmlformats.org/presentationml/2006/main">
   <p:cSld>
     <p:spTree>
@@ -15459,7 +15608,7 @@
 </p:sld>
 </file>
 
-<file path=ppt/slides/slide26.xml><?xml version="1.0" encoding="utf-8"?>
+<file path=ppt/slides/slide25.xml><?xml version="1.0" encoding="utf-8"?>
 <p:sld xmlns:a="http://schemas.openxmlformats.org/drawingml/2006/main" xmlns:r="http://schemas.openxmlformats.org/officeDocument/2006/relationships" xmlns:p="http://schemas.openxmlformats.org/presentationml/2006/main">
   <p:cSld>
     <p:spTree>
@@ -16136,7 +16285,7 @@
 </p:sld>
 </file>
 
-<file path=ppt/slides/slide27.xml><?xml version="1.0" encoding="utf-8"?>
+<file path=ppt/slides/slide26.xml><?xml version="1.0" encoding="utf-8"?>
 <p:sld xmlns:a="http://schemas.openxmlformats.org/drawingml/2006/main" xmlns:r="http://schemas.openxmlformats.org/officeDocument/2006/relationships" xmlns:p="http://schemas.openxmlformats.org/presentationml/2006/main">
   <p:cSld>
     <p:spTree>
@@ -16172,7 +16321,7 @@
           </a:ln>
           <a:extLst>
             <a:ext uri="{C572A759-6A51-4108-AA02-DFA0A04FC94B}">
-              <ma14:wrappingTextBoxFlag xmlns:ma14="http://schemas.microsoft.com/office/mac/drawingml/2011/main" xmlns:a14="http://schemas.microsoft.com/office/drawing/2010/main" xmlns:m="http://schemas.openxmlformats.org/officeDocument/2006/math" xmlns="" val="1"/>
+              <ma14:wrappingTextBoxFlag xmlns="" xmlns:m="http://schemas.openxmlformats.org/officeDocument/2006/math" xmlns:a14="http://schemas.microsoft.com/office/drawing/2010/main" xmlns:ma14="http://schemas.microsoft.com/office/mac/drawingml/2011/main" val="1"/>
             </a:ext>
           </a:extLst>
         </p:spPr>
@@ -16311,7 +16460,7 @@
           </a:ln>
           <a:extLst>
             <a:ext uri="{C572A759-6A51-4108-AA02-DFA0A04FC94B}">
-              <ma14:wrappingTextBoxFlag xmlns:ma14="http://schemas.microsoft.com/office/mac/drawingml/2011/main" xmlns:a14="http://schemas.microsoft.com/office/drawing/2010/main" xmlns:m="http://schemas.openxmlformats.org/officeDocument/2006/math" xmlns="" val="1"/>
+              <ma14:wrappingTextBoxFlag xmlns="" xmlns:m="http://schemas.openxmlformats.org/officeDocument/2006/math" xmlns:a14="http://schemas.microsoft.com/office/drawing/2010/main" xmlns:ma14="http://schemas.microsoft.com/office/mac/drawingml/2011/main" val="1"/>
             </a:ext>
           </a:extLst>
         </p:spPr>
@@ -16366,7 +16515,7 @@
           </a:ln>
           <a:extLst>
             <a:ext uri="{C572A759-6A51-4108-AA02-DFA0A04FC94B}">
-              <ma14:wrappingTextBoxFlag xmlns:ma14="http://schemas.microsoft.com/office/mac/drawingml/2011/main" xmlns:a14="http://schemas.microsoft.com/office/drawing/2010/main" xmlns:m="http://schemas.openxmlformats.org/officeDocument/2006/math" xmlns="" val="1"/>
+              <ma14:wrappingTextBoxFlag xmlns="" xmlns:m="http://schemas.openxmlformats.org/officeDocument/2006/math" xmlns:a14="http://schemas.microsoft.com/office/drawing/2010/main" xmlns:ma14="http://schemas.microsoft.com/office/mac/drawingml/2011/main" val="1"/>
             </a:ext>
           </a:extLst>
         </p:spPr>
@@ -16411,7 +16560,7 @@
 </p:sld>
 </file>
 
-<file path=ppt/slides/slide28.xml><?xml version="1.0" encoding="utf-8"?>
+<file path=ppt/slides/slide27.xml><?xml version="1.0" encoding="utf-8"?>
 <p:sld xmlns:a="http://schemas.openxmlformats.org/drawingml/2006/main" xmlns:r="http://schemas.openxmlformats.org/officeDocument/2006/relationships" xmlns:p="http://schemas.openxmlformats.org/presentationml/2006/main">
   <p:cSld>
     <p:spTree>
@@ -16437,7 +16586,7 @@
           <p:nvPr/>
         </p:nvPicPr>
         <p:blipFill>
-          <a:blip r:embed="rId2"/>
+          <a:blip r:embed="rId3"/>
           <a:stretch>
             <a:fillRect/>
           </a:stretch>
@@ -16464,7 +16613,7 @@
 </p:sld>
 </file>
 
-<file path=ppt/slides/slide29.xml><?xml version="1.0" encoding="utf-8"?>
+<file path=ppt/slides/slide28.xml><?xml version="1.0" encoding="utf-8"?>
 <p:sld xmlns:a="http://schemas.openxmlformats.org/drawingml/2006/main" xmlns:r="http://schemas.openxmlformats.org/officeDocument/2006/relationships" xmlns:p="http://schemas.openxmlformats.org/presentationml/2006/main">
   <p:cSld>
     <p:spTree>
@@ -16564,7 +16713,7 @@
           </a:ln>
           <a:extLst>
             <a:ext uri="{C572A759-6A51-4108-AA02-DFA0A04FC94B}">
-              <ma14:wrappingTextBoxFlag xmlns:ma14="http://schemas.microsoft.com/office/mac/drawingml/2011/main" xmlns:a14="http://schemas.microsoft.com/office/drawing/2010/main" xmlns:m="http://schemas.openxmlformats.org/officeDocument/2006/math" xmlns="" val="1"/>
+              <ma14:wrappingTextBoxFlag xmlns="" xmlns:m="http://schemas.openxmlformats.org/officeDocument/2006/math" xmlns:a14="http://schemas.microsoft.com/office/drawing/2010/main" xmlns:ma14="http://schemas.microsoft.com/office/mac/drawingml/2011/main" val="1"/>
             </a:ext>
           </a:extLst>
         </p:spPr>
@@ -16619,7 +16768,7 @@
           </a:ln>
           <a:extLst>
             <a:ext uri="{C572A759-6A51-4108-AA02-DFA0A04FC94B}">
-              <ma14:wrappingTextBoxFlag xmlns:ma14="http://schemas.microsoft.com/office/mac/drawingml/2011/main" xmlns:a14="http://schemas.microsoft.com/office/drawing/2010/main" xmlns:m="http://schemas.openxmlformats.org/officeDocument/2006/math" xmlns="" val="1"/>
+              <ma14:wrappingTextBoxFlag xmlns="" xmlns:m="http://schemas.openxmlformats.org/officeDocument/2006/math" xmlns:a14="http://schemas.microsoft.com/office/drawing/2010/main" xmlns:ma14="http://schemas.microsoft.com/office/mac/drawingml/2011/main" val="1"/>
             </a:ext>
           </a:extLst>
         </p:spPr>
@@ -16664,60 +16813,7 @@
 </p:sld>
 </file>
 
-<file path=ppt/slides/slide3.xml><?xml version="1.0" encoding="utf-8"?>
-<p:sld xmlns:a="http://schemas.openxmlformats.org/drawingml/2006/main" xmlns:r="http://schemas.openxmlformats.org/officeDocument/2006/relationships" xmlns:p="http://schemas.openxmlformats.org/presentationml/2006/main">
-  <p:cSld>
-    <p:spTree>
-      <p:nvGrpSpPr>
-        <p:cNvPr id="1" name=""/>
-        <p:cNvGrpSpPr/>
-        <p:nvPr/>
-      </p:nvGrpSpPr>
-      <p:grpSpPr>
-        <a:xfrm>
-          <a:off x="0" y="0"/>
-          <a:ext cx="0" cy="0"/>
-          <a:chOff x="0" y="0"/>
-          <a:chExt cx="0" cy="0"/>
-        </a:xfrm>
-      </p:grpSpPr>
-      <p:pic>
-        <p:nvPicPr>
-          <p:cNvPr id="124" name="pasted-image.png" descr="pasted-image.png"/>
-          <p:cNvPicPr>
-            <a:picLocks noChangeAspect="1"/>
-          </p:cNvPicPr>
-          <p:nvPr/>
-        </p:nvPicPr>
-        <p:blipFill>
-          <a:blip r:embed="rId2"/>
-          <a:stretch>
-            <a:fillRect/>
-          </a:stretch>
-        </p:blipFill>
-        <p:spPr>
-          <a:xfrm>
-            <a:off x="1295536" y="308815"/>
-            <a:ext cx="10413728" cy="9135970"/>
-          </a:xfrm>
-          <a:prstGeom prst="rect">
-            <a:avLst/>
-          </a:prstGeom>
-          <a:ln w="12700">
-            <a:miter lim="400000"/>
-          </a:ln>
-        </p:spPr>
-      </p:pic>
-    </p:spTree>
-  </p:cSld>
-  <p:clrMapOvr>
-    <a:masterClrMapping/>
-  </p:clrMapOvr>
-  <p:transition spd="med"/>
-</p:sld>
-</file>
-
-<file path=ppt/slides/slide30.xml><?xml version="1.0" encoding="utf-8"?>
+<file path=ppt/slides/slide29.xml><?xml version="1.0" encoding="utf-8"?>
 <p:sld xmlns:a="http://schemas.openxmlformats.org/drawingml/2006/main" xmlns:r="http://schemas.openxmlformats.org/officeDocument/2006/relationships" xmlns:p="http://schemas.openxmlformats.org/presentationml/2006/main">
   <p:cSld>
     <p:spTree>
@@ -16855,7 +16951,60 @@
 </p:sld>
 </file>
 
-<file path=ppt/slides/slide31.xml><?xml version="1.0" encoding="utf-8"?>
+<file path=ppt/slides/slide3.xml><?xml version="1.0" encoding="utf-8"?>
+<p:sld xmlns:a="http://schemas.openxmlformats.org/drawingml/2006/main" xmlns:r="http://schemas.openxmlformats.org/officeDocument/2006/relationships" xmlns:p="http://schemas.openxmlformats.org/presentationml/2006/main">
+  <p:cSld>
+    <p:spTree>
+      <p:nvGrpSpPr>
+        <p:cNvPr id="1" name=""/>
+        <p:cNvGrpSpPr/>
+        <p:nvPr/>
+      </p:nvGrpSpPr>
+      <p:grpSpPr>
+        <a:xfrm>
+          <a:off x="0" y="0"/>
+          <a:ext cx="0" cy="0"/>
+          <a:chOff x="0" y="0"/>
+          <a:chExt cx="0" cy="0"/>
+        </a:xfrm>
+      </p:grpSpPr>
+      <p:pic>
+        <p:nvPicPr>
+          <p:cNvPr id="124" name="pasted-image.png" descr="pasted-image.png"/>
+          <p:cNvPicPr>
+            <a:picLocks noChangeAspect="1"/>
+          </p:cNvPicPr>
+          <p:nvPr/>
+        </p:nvPicPr>
+        <p:blipFill>
+          <a:blip r:embed="rId2"/>
+          <a:stretch>
+            <a:fillRect/>
+          </a:stretch>
+        </p:blipFill>
+        <p:spPr>
+          <a:xfrm>
+            <a:off x="1295536" y="308815"/>
+            <a:ext cx="10413728" cy="9135970"/>
+          </a:xfrm>
+          <a:prstGeom prst="rect">
+            <a:avLst/>
+          </a:prstGeom>
+          <a:ln w="12700">
+            <a:miter lim="400000"/>
+          </a:ln>
+        </p:spPr>
+      </p:pic>
+    </p:spTree>
+  </p:cSld>
+  <p:clrMapOvr>
+    <a:masterClrMapping/>
+  </p:clrMapOvr>
+  <p:transition spd="med"/>
+</p:sld>
+</file>
+
+<file path=ppt/slides/slide30.xml><?xml version="1.0" encoding="utf-8"?>
 <p:sld xmlns:a="http://schemas.openxmlformats.org/drawingml/2006/main" xmlns:r="http://schemas.openxmlformats.org/officeDocument/2006/relationships" xmlns:p="http://schemas.openxmlformats.org/presentationml/2006/main">
   <p:cSld>
     <p:spTree>
@@ -16996,7 +17145,7 @@
 </p:sld>
 </file>
 
-<file path=ppt/slides/slide32.xml><?xml version="1.0" encoding="utf-8"?>
+<file path=ppt/slides/slide31.xml><?xml version="1.0" encoding="utf-8"?>
 <p:sld xmlns:a="http://schemas.openxmlformats.org/drawingml/2006/main" xmlns:r="http://schemas.openxmlformats.org/officeDocument/2006/relationships" xmlns:p="http://schemas.openxmlformats.org/presentationml/2006/main">
   <p:cSld>
     <p:spTree>
@@ -17032,7 +17181,7 @@
           </a:ln>
           <a:extLst>
             <a:ext uri="{C572A759-6A51-4108-AA02-DFA0A04FC94B}">
-              <ma14:wrappingTextBoxFlag xmlns:ma14="http://schemas.microsoft.com/office/mac/drawingml/2011/main" xmlns:a14="http://schemas.microsoft.com/office/drawing/2010/main" xmlns:m="http://schemas.openxmlformats.org/officeDocument/2006/math" xmlns="" val="1"/>
+              <ma14:wrappingTextBoxFlag xmlns="" xmlns:m="http://schemas.openxmlformats.org/officeDocument/2006/math" xmlns:a14="http://schemas.microsoft.com/office/drawing/2010/main" xmlns:ma14="http://schemas.microsoft.com/office/mac/drawingml/2011/main" val="1"/>
             </a:ext>
           </a:extLst>
         </p:spPr>
@@ -17076,7 +17225,7 @@
 </p:sld>
 </file>
 
-<file path=ppt/slides/slide33.xml><?xml version="1.0" encoding="utf-8"?>
+<file path=ppt/slides/slide32.xml><?xml version="1.0" encoding="utf-8"?>
 <p:sld xmlns:a="http://schemas.openxmlformats.org/drawingml/2006/main" xmlns:r="http://schemas.openxmlformats.org/officeDocument/2006/relationships" xmlns:p="http://schemas.openxmlformats.org/presentationml/2006/main">
   <p:cSld>
     <p:spTree>
@@ -17112,7 +17261,7 @@
           </a:ln>
           <a:extLst>
             <a:ext uri="{C572A759-6A51-4108-AA02-DFA0A04FC94B}">
-              <ma14:wrappingTextBoxFlag xmlns:ma14="http://schemas.microsoft.com/office/mac/drawingml/2011/main" xmlns:a14="http://schemas.microsoft.com/office/drawing/2010/main" xmlns:m="http://schemas.openxmlformats.org/officeDocument/2006/math" xmlns="" val="1"/>
+              <ma14:wrappingTextBoxFlag xmlns="" xmlns:m="http://schemas.openxmlformats.org/officeDocument/2006/math" xmlns:a14="http://schemas.microsoft.com/office/drawing/2010/main" xmlns:ma14="http://schemas.microsoft.com/office/mac/drawingml/2011/main" val="1"/>
             </a:ext>
           </a:extLst>
         </p:spPr>
@@ -17207,7 +17356,7 @@
             <a:effectLst/>
             <a:extLst>
               <a:ext uri="{C572A759-6A51-4108-AA02-DFA0A04FC94B}">
-                <ma14:wrappingTextBoxFlag xmlns:ma14="http://schemas.microsoft.com/office/mac/drawingml/2011/main" xmlns:a14="http://schemas.microsoft.com/office/drawing/2010/main" xmlns:m="http://schemas.openxmlformats.org/officeDocument/2006/math" xmlns="" val="1"/>
+                <ma14:wrappingTextBoxFlag xmlns="" xmlns:m="http://schemas.openxmlformats.org/officeDocument/2006/math" xmlns:a14="http://schemas.microsoft.com/office/drawing/2010/main" xmlns:ma14="http://schemas.microsoft.com/office/mac/drawingml/2011/main" val="1"/>
               </a:ext>
             </a:extLst>
           </p:spPr>
@@ -17317,7 +17466,7 @@
             <a:effectLst/>
             <a:extLst>
               <a:ext uri="{C572A759-6A51-4108-AA02-DFA0A04FC94B}">
-                <ma14:wrappingTextBoxFlag xmlns:ma14="http://schemas.microsoft.com/office/mac/drawingml/2011/main" xmlns:a14="http://schemas.microsoft.com/office/drawing/2010/main" xmlns:m="http://schemas.openxmlformats.org/officeDocument/2006/math" xmlns="" val="1"/>
+                <ma14:wrappingTextBoxFlag xmlns="" xmlns:m="http://schemas.openxmlformats.org/officeDocument/2006/math" xmlns:a14="http://schemas.microsoft.com/office/drawing/2010/main" xmlns:ma14="http://schemas.microsoft.com/office/mac/drawingml/2011/main" val="1"/>
               </a:ext>
             </a:extLst>
           </p:spPr>
@@ -17362,7 +17511,7 @@
           </a:ln>
           <a:extLst>
             <a:ext uri="{C572A759-6A51-4108-AA02-DFA0A04FC94B}">
-              <ma14:wrappingTextBoxFlag xmlns:ma14="http://schemas.microsoft.com/office/mac/drawingml/2011/main" xmlns:a14="http://schemas.microsoft.com/office/drawing/2010/main" xmlns:m="http://schemas.openxmlformats.org/officeDocument/2006/math" xmlns="" val="1"/>
+              <ma14:wrappingTextBoxFlag xmlns="" xmlns:m="http://schemas.openxmlformats.org/officeDocument/2006/math" xmlns:a14="http://schemas.microsoft.com/office/drawing/2010/main" xmlns:ma14="http://schemas.microsoft.com/office/mac/drawingml/2011/main" val="1"/>
             </a:ext>
           </a:extLst>
         </p:spPr>
@@ -17406,7 +17555,7 @@
           </a:ln>
           <a:extLst>
             <a:ext uri="{C572A759-6A51-4108-AA02-DFA0A04FC94B}">
-              <ma14:wrappingTextBoxFlag xmlns:ma14="http://schemas.microsoft.com/office/mac/drawingml/2011/main" xmlns:a14="http://schemas.microsoft.com/office/drawing/2010/main" xmlns:m="http://schemas.openxmlformats.org/officeDocument/2006/math" xmlns="" val="1"/>
+              <ma14:wrappingTextBoxFlag xmlns="" xmlns:m="http://schemas.openxmlformats.org/officeDocument/2006/math" xmlns:a14="http://schemas.microsoft.com/office/drawing/2010/main" xmlns:ma14="http://schemas.microsoft.com/office/mac/drawingml/2011/main" val="1"/>
             </a:ext>
           </a:extLst>
         </p:spPr>
@@ -17450,7 +17599,7 @@
           </a:ln>
           <a:extLst>
             <a:ext uri="{C572A759-6A51-4108-AA02-DFA0A04FC94B}">
-              <ma14:wrappingTextBoxFlag xmlns:ma14="http://schemas.microsoft.com/office/mac/drawingml/2011/main" xmlns:a14="http://schemas.microsoft.com/office/drawing/2010/main" xmlns:m="http://schemas.openxmlformats.org/officeDocument/2006/math" xmlns="" val="1"/>
+              <ma14:wrappingTextBoxFlag xmlns="" xmlns:m="http://schemas.openxmlformats.org/officeDocument/2006/math" xmlns:a14="http://schemas.microsoft.com/office/drawing/2010/main" xmlns:ma14="http://schemas.microsoft.com/office/mac/drawingml/2011/main" val="1"/>
             </a:ext>
           </a:extLst>
         </p:spPr>
@@ -17494,7 +17643,7 @@
           </a:ln>
           <a:extLst>
             <a:ext uri="{C572A759-6A51-4108-AA02-DFA0A04FC94B}">
-              <ma14:wrappingTextBoxFlag xmlns:ma14="http://schemas.microsoft.com/office/mac/drawingml/2011/main" xmlns:a14="http://schemas.microsoft.com/office/drawing/2010/main" xmlns:m="http://schemas.openxmlformats.org/officeDocument/2006/math" xmlns="" val="1"/>
+              <ma14:wrappingTextBoxFlag xmlns="" xmlns:m="http://schemas.openxmlformats.org/officeDocument/2006/math" xmlns:a14="http://schemas.microsoft.com/office/drawing/2010/main" xmlns:ma14="http://schemas.microsoft.com/office/mac/drawingml/2011/main" val="1"/>
             </a:ext>
           </a:extLst>
         </p:spPr>
@@ -17538,7 +17687,7 @@
           </a:ln>
           <a:extLst>
             <a:ext uri="{C572A759-6A51-4108-AA02-DFA0A04FC94B}">
-              <ma14:wrappingTextBoxFlag xmlns:ma14="http://schemas.microsoft.com/office/mac/drawingml/2011/main" xmlns:a14="http://schemas.microsoft.com/office/drawing/2010/main" xmlns:m="http://schemas.openxmlformats.org/officeDocument/2006/math" xmlns="" val="1"/>
+              <ma14:wrappingTextBoxFlag xmlns="" xmlns:m="http://schemas.openxmlformats.org/officeDocument/2006/math" xmlns:a14="http://schemas.microsoft.com/office/drawing/2010/main" xmlns:ma14="http://schemas.microsoft.com/office/mac/drawingml/2011/main" val="1"/>
             </a:ext>
           </a:extLst>
         </p:spPr>
@@ -17572,7 +17721,7 @@
 </p:sld>
 </file>
 
-<file path=ppt/slides/slide34.xml><?xml version="1.0" encoding="utf-8"?>
+<file path=ppt/slides/slide33.xml><?xml version="1.0" encoding="utf-8"?>
 <p:sld xmlns:a="http://schemas.openxmlformats.org/drawingml/2006/main" xmlns:r="http://schemas.openxmlformats.org/officeDocument/2006/relationships" xmlns:p="http://schemas.openxmlformats.org/presentationml/2006/main">
   <p:cSld>
     <p:spTree>
@@ -17688,7 +17837,7 @@
 </p:sld>
 </file>
 
-<file path=ppt/slides/slide35.xml><?xml version="1.0" encoding="utf-8"?>
+<file path=ppt/slides/slide34.xml><?xml version="1.0" encoding="utf-8"?>
 <p:sld xmlns:a="http://schemas.openxmlformats.org/drawingml/2006/main" xmlns:r="http://schemas.openxmlformats.org/officeDocument/2006/relationships" xmlns:p="http://schemas.openxmlformats.org/presentationml/2006/main">
   <p:cSld>
     <p:spTree>
@@ -17751,7 +17900,7 @@
           </a:ln>
           <a:extLst>
             <a:ext uri="{C572A759-6A51-4108-AA02-DFA0A04FC94B}">
-              <ma14:wrappingTextBoxFlag xmlns:ma14="http://schemas.microsoft.com/office/mac/drawingml/2011/main" xmlns:a14="http://schemas.microsoft.com/office/drawing/2010/main" xmlns:m="http://schemas.openxmlformats.org/officeDocument/2006/math" xmlns="" val="1"/>
+              <ma14:wrappingTextBoxFlag xmlns="" xmlns:m="http://schemas.openxmlformats.org/officeDocument/2006/math" xmlns:a14="http://schemas.microsoft.com/office/drawing/2010/main" xmlns:ma14="http://schemas.microsoft.com/office/mac/drawingml/2011/main" val="1"/>
             </a:ext>
           </a:extLst>
         </p:spPr>
@@ -17785,7 +17934,7 @@
 </p:sld>
 </file>
 
-<file path=ppt/slides/slide36.xml><?xml version="1.0" encoding="utf-8"?>
+<file path=ppt/slides/slide35.xml><?xml version="1.0" encoding="utf-8"?>
 <p:sld xmlns:a="http://schemas.openxmlformats.org/drawingml/2006/main" xmlns:r="http://schemas.openxmlformats.org/officeDocument/2006/relationships" xmlns:p="http://schemas.openxmlformats.org/presentationml/2006/main">
   <p:cSld>
     <p:spTree>
@@ -17931,7 +18080,7 @@
 </p:sld>
 </file>
 
-<file path=ppt/slides/slide37.xml><?xml version="1.0" encoding="utf-8"?>
+<file path=ppt/slides/slide36.xml><?xml version="1.0" encoding="utf-8"?>
 <p:sld xmlns:a="http://schemas.openxmlformats.org/drawingml/2006/main" xmlns:r="http://schemas.openxmlformats.org/officeDocument/2006/relationships" xmlns:p="http://schemas.openxmlformats.org/presentationml/2006/main">
   <p:cSld>
     <p:spTree>
@@ -17994,7 +18143,7 @@
           </a:ln>
           <a:extLst>
             <a:ext uri="{C572A759-6A51-4108-AA02-DFA0A04FC94B}">
-              <ma14:wrappingTextBoxFlag xmlns="" xmlns:m="http://schemas.openxmlformats.org/officeDocument/2006/math" xmlns:a14="http://schemas.microsoft.com/office/drawing/2010/main" xmlns:ma14="http://schemas.microsoft.com/office/mac/drawingml/2011/main" val="1"/>
+              <ma14:wrappingTextBoxFlag xmlns:ma14="http://schemas.microsoft.com/office/mac/drawingml/2011/main" xmlns:a14="http://schemas.microsoft.com/office/drawing/2010/main" xmlns:m="http://schemas.openxmlformats.org/officeDocument/2006/math" xmlns="" val="1"/>
             </a:ext>
           </a:extLst>
         </p:spPr>
@@ -18069,7 +18218,7 @@
 </p:sld>
 </file>
 
-<file path=ppt/slides/slide38.xml><?xml version="1.0" encoding="utf-8"?>
+<file path=ppt/slides/slide37.xml><?xml version="1.0" encoding="utf-8"?>
 <p:sld xmlns:a="http://schemas.openxmlformats.org/drawingml/2006/main" xmlns:r="http://schemas.openxmlformats.org/officeDocument/2006/relationships" xmlns:p="http://schemas.openxmlformats.org/presentationml/2006/main">
   <p:cSld>
     <p:spTree>
@@ -18205,7 +18354,7 @@
 </p:sld>
 </file>
 
-<file path=ppt/slides/slide39.xml><?xml version="1.0" encoding="utf-8"?>
+<file path=ppt/slides/slide38.xml><?xml version="1.0" encoding="utf-8"?>
 <p:sld xmlns:a="http://schemas.openxmlformats.org/drawingml/2006/main" xmlns:r="http://schemas.openxmlformats.org/officeDocument/2006/relationships" xmlns:p="http://schemas.openxmlformats.org/presentationml/2006/main">
   <p:cSld>
     <p:spTree>
@@ -18515,6 +18664,154 @@
     <p:extLst>
       <p:ext uri="{BB962C8B-B14F-4D97-AF65-F5344CB8AC3E}">
         <p14:creationId xmlns:p14="http://schemas.microsoft.com/office/powerpoint/2010/main" val="1215871647"/>
+      </p:ext>
+    </p:extLst>
+  </p:cSld>
+  <p:clrMapOvr>
+    <a:masterClrMapping/>
+  </p:clrMapOvr>
+</p:sld>
+</file>
+
+<file path=ppt/slides/slide39.xml><?xml version="1.0" encoding="utf-8"?>
+<p:sld xmlns:a="http://schemas.openxmlformats.org/drawingml/2006/main" xmlns:r="http://schemas.openxmlformats.org/officeDocument/2006/relationships" xmlns:p="http://schemas.openxmlformats.org/presentationml/2006/main">
+  <p:cSld>
+    <p:spTree>
+      <p:nvGrpSpPr>
+        <p:cNvPr id="1" name=""/>
+        <p:cNvGrpSpPr/>
+        <p:nvPr/>
+      </p:nvGrpSpPr>
+      <p:grpSpPr>
+        <a:xfrm>
+          <a:off x="0" y="0"/>
+          <a:ext cx="0" cy="0"/>
+          <a:chOff x="0" y="0"/>
+          <a:chExt cx="0" cy="0"/>
+        </a:xfrm>
+      </p:grpSpPr>
+      <p:sp>
+        <p:nvSpPr>
+          <p:cNvPr id="2" name="Titel 1">
+            <a:extLst>
+              <a:ext uri="{FF2B5EF4-FFF2-40B4-BE49-F238E27FC236}">
+                <a16:creationId xmlns:a16="http://schemas.microsoft.com/office/drawing/2014/main" id="{3FE860AA-8902-86F3-120B-4D7D7F693E8D}"/>
+              </a:ext>
+            </a:extLst>
+          </p:cNvPr>
+          <p:cNvSpPr>
+            <a:spLocks noGrp="1"/>
+          </p:cNvSpPr>
+          <p:nvPr>
+            <p:ph type="title"/>
+          </p:nvPr>
+        </p:nvSpPr>
+        <p:spPr/>
+        <p:txBody>
+          <a:bodyPr/>
+          <a:lstStyle/>
+          <a:p>
+            <a:r>
+              <a:rPr lang="nl-NL"/>
+              <a:t>RandomizedSearchCV</a:t>
+            </a:r>
+          </a:p>
+        </p:txBody>
+      </p:sp>
+      <p:sp>
+        <p:nvSpPr>
+          <p:cNvPr id="3" name="Tijdelijke aanduiding voor inhoud 2">
+            <a:extLst>
+              <a:ext uri="{FF2B5EF4-FFF2-40B4-BE49-F238E27FC236}">
+                <a16:creationId xmlns:a16="http://schemas.microsoft.com/office/drawing/2014/main" id="{E7633B9C-8941-26C5-BD39-C87C69E66656}"/>
+              </a:ext>
+            </a:extLst>
+          </p:cNvPr>
+          <p:cNvSpPr>
+            <a:spLocks noGrp="1"/>
+          </p:cNvSpPr>
+          <p:nvPr>
+            <p:ph idx="1"/>
+          </p:nvPr>
+        </p:nvSpPr>
+        <p:spPr/>
+        <p:txBody>
+          <a:bodyPr/>
+          <a:lstStyle/>
+          <a:p>
+            <a:r>
+              <a:rPr lang="nl-NL"/>
+              <a:t>Performt veel beter dan GridSearchCV</a:t>
+            </a:r>
+          </a:p>
+          <a:p>
+            <a:pPr lvl="1"/>
+            <a:r>
+              <a:rPr lang="nl-NL"/>
+              <a:t>Toevoegen van parameters maakt niet uit voor de doorlooptijd</a:t>
+            </a:r>
+          </a:p>
+          <a:p>
+            <a:r>
+              <a:rPr lang="nl-NL"/>
+              <a:t>Werkt soms zelfs beter dan GridSearchCV</a:t>
+            </a:r>
+          </a:p>
+          <a:p>
+            <a:pPr lvl="1"/>
+            <a:r>
+              <a:rPr lang="nl-NL"/>
+              <a:t>Van continue variabelen </a:t>
+            </a:r>
+            <a:r>
+              <a:rPr lang="nl-NL" i="1"/>
+              <a:t>kan</a:t>
+            </a:r>
+            <a:r>
+              <a:rPr lang="nl-NL"/>
+              <a:t> hiermee elke waarde aan bod komen</a:t>
+            </a:r>
+          </a:p>
+          <a:p>
+            <a:r>
+              <a:rPr lang="nl-NL"/>
+              <a:t>Parameter </a:t>
+            </a:r>
+            <a:r>
+              <a:rPr lang="nl-NL" i="1"/>
+              <a:t>n_iter </a:t>
+            </a:r>
+            <a:r>
+              <a:rPr lang="nl-NL"/>
+              <a:t>bepaalt hoeveel iteraties je wilt doen</a:t>
+            </a:r>
+          </a:p>
+          <a:p>
+            <a:r>
+              <a:rPr lang="nl-NL"/>
+              <a:t>In elke iteratie wordt een random combinatie geprobeerd</a:t>
+            </a:r>
+          </a:p>
+          <a:p>
+            <a:r>
+              <a:rPr lang="nl-NL" i="1"/>
+              <a:t>param_grid </a:t>
+            </a:r>
+            <a:r>
+              <a:rPr lang="nl-NL"/>
+              <a:t>=&gt; </a:t>
+            </a:r>
+            <a:r>
+              <a:rPr lang="nl-NL" b="1" i="1"/>
+              <a:t>param_distributions</a:t>
+            </a:r>
+          </a:p>
+        </p:txBody>
+      </p:sp>
+    </p:spTree>
+    <p:extLst>
+      <p:ext uri="{BB962C8B-B14F-4D97-AF65-F5344CB8AC3E}">
+        <p14:creationId xmlns:p14="http://schemas.microsoft.com/office/powerpoint/2010/main" val="2566703897"/>
       </p:ext>
     </p:extLst>
   </p:cSld>
@@ -18599,154 +18896,6 @@
           <p:cNvPr id="2" name="Titel 1">
             <a:extLst>
               <a:ext uri="{FF2B5EF4-FFF2-40B4-BE49-F238E27FC236}">
-                <a16:creationId xmlns:a16="http://schemas.microsoft.com/office/drawing/2014/main" id="{3FE860AA-8902-86F3-120B-4D7D7F693E8D}"/>
-              </a:ext>
-            </a:extLst>
-          </p:cNvPr>
-          <p:cNvSpPr>
-            <a:spLocks noGrp="1"/>
-          </p:cNvSpPr>
-          <p:nvPr>
-            <p:ph type="title"/>
-          </p:nvPr>
-        </p:nvSpPr>
-        <p:spPr/>
-        <p:txBody>
-          <a:bodyPr/>
-          <a:lstStyle/>
-          <a:p>
-            <a:r>
-              <a:rPr lang="nl-NL"/>
-              <a:t>RandomizedSearchCV</a:t>
-            </a:r>
-          </a:p>
-        </p:txBody>
-      </p:sp>
-      <p:sp>
-        <p:nvSpPr>
-          <p:cNvPr id="3" name="Tijdelijke aanduiding voor inhoud 2">
-            <a:extLst>
-              <a:ext uri="{FF2B5EF4-FFF2-40B4-BE49-F238E27FC236}">
-                <a16:creationId xmlns:a16="http://schemas.microsoft.com/office/drawing/2014/main" id="{E7633B9C-8941-26C5-BD39-C87C69E66656}"/>
-              </a:ext>
-            </a:extLst>
-          </p:cNvPr>
-          <p:cNvSpPr>
-            <a:spLocks noGrp="1"/>
-          </p:cNvSpPr>
-          <p:nvPr>
-            <p:ph idx="1"/>
-          </p:nvPr>
-        </p:nvSpPr>
-        <p:spPr/>
-        <p:txBody>
-          <a:bodyPr/>
-          <a:lstStyle/>
-          <a:p>
-            <a:r>
-              <a:rPr lang="nl-NL"/>
-              <a:t>Performt veel beter dan GridSearchCV</a:t>
-            </a:r>
-          </a:p>
-          <a:p>
-            <a:pPr lvl="1"/>
-            <a:r>
-              <a:rPr lang="nl-NL"/>
-              <a:t>Toevoegen van parameters maakt niet uit voor de doorlooptijd</a:t>
-            </a:r>
-          </a:p>
-          <a:p>
-            <a:r>
-              <a:rPr lang="nl-NL"/>
-              <a:t>Werkt soms zelfs beter dan GridSearchCV</a:t>
-            </a:r>
-          </a:p>
-          <a:p>
-            <a:pPr lvl="1"/>
-            <a:r>
-              <a:rPr lang="nl-NL"/>
-              <a:t>Van continue variabelen </a:t>
-            </a:r>
-            <a:r>
-              <a:rPr lang="nl-NL" i="1"/>
-              <a:t>kan</a:t>
-            </a:r>
-            <a:r>
-              <a:rPr lang="nl-NL"/>
-              <a:t> hiermee elke waarde aan bod komen</a:t>
-            </a:r>
-          </a:p>
-          <a:p>
-            <a:r>
-              <a:rPr lang="nl-NL"/>
-              <a:t>Parameter </a:t>
-            </a:r>
-            <a:r>
-              <a:rPr lang="nl-NL" i="1"/>
-              <a:t>n_iter </a:t>
-            </a:r>
-            <a:r>
-              <a:rPr lang="nl-NL"/>
-              <a:t>bepaalt hoeveel iteraties je wilt doen</a:t>
-            </a:r>
-          </a:p>
-          <a:p>
-            <a:r>
-              <a:rPr lang="nl-NL"/>
-              <a:t>In elke iteratie wordt een random combinatie geprobeerd</a:t>
-            </a:r>
-          </a:p>
-          <a:p>
-            <a:r>
-              <a:rPr lang="nl-NL" i="1"/>
-              <a:t>param_grid </a:t>
-            </a:r>
-            <a:r>
-              <a:rPr lang="nl-NL"/>
-              <a:t>=&gt; </a:t>
-            </a:r>
-            <a:r>
-              <a:rPr lang="nl-NL" b="1" i="1"/>
-              <a:t>param_distributions</a:t>
-            </a:r>
-          </a:p>
-        </p:txBody>
-      </p:sp>
-    </p:spTree>
-    <p:extLst>
-      <p:ext uri="{BB962C8B-B14F-4D97-AF65-F5344CB8AC3E}">
-        <p14:creationId xmlns:p14="http://schemas.microsoft.com/office/powerpoint/2010/main" val="2566703897"/>
-      </p:ext>
-    </p:extLst>
-  </p:cSld>
-  <p:clrMapOvr>
-    <a:masterClrMapping/>
-  </p:clrMapOvr>
-</p:sld>
-</file>
-
-<file path=ppt/slides/slide41.xml><?xml version="1.0" encoding="utf-8"?>
-<p:sld xmlns:a="http://schemas.openxmlformats.org/drawingml/2006/main" xmlns:r="http://schemas.openxmlformats.org/officeDocument/2006/relationships" xmlns:p="http://schemas.openxmlformats.org/presentationml/2006/main">
-  <p:cSld>
-    <p:spTree>
-      <p:nvGrpSpPr>
-        <p:cNvPr id="1" name=""/>
-        <p:cNvGrpSpPr/>
-        <p:nvPr/>
-      </p:nvGrpSpPr>
-      <p:grpSpPr>
-        <a:xfrm>
-          <a:off x="0" y="0"/>
-          <a:ext cx="0" cy="0"/>
-          <a:chOff x="0" y="0"/>
-          <a:chExt cx="0" cy="0"/>
-        </a:xfrm>
-      </p:grpSpPr>
-      <p:sp>
-        <p:nvSpPr>
-          <p:cNvPr id="2" name="Titel 1">
-            <a:extLst>
-              <a:ext uri="{FF2B5EF4-FFF2-40B4-BE49-F238E27FC236}">
                 <a16:creationId xmlns:a16="http://schemas.microsoft.com/office/drawing/2014/main" id="{120A2CC3-C13D-E93D-1C30-0611F416CCE7}"/>
               </a:ext>
             </a:extLst>
@@ -19047,7 +19196,7 @@
 </p:sld>
 </file>
 
-<file path=ppt/slides/slide42.xml><?xml version="1.0" encoding="utf-8"?>
+<file path=ppt/slides/slide41.xml><?xml version="1.0" encoding="utf-8"?>
 <p:sld xmlns:a="http://schemas.openxmlformats.org/drawingml/2006/main" xmlns:r="http://schemas.openxmlformats.org/officeDocument/2006/relationships" xmlns:p="http://schemas.openxmlformats.org/presentationml/2006/main">
   <p:cSld>
     <p:spTree>
@@ -19196,7 +19345,7 @@
 </p:sld>
 </file>
 
-<file path=ppt/slides/slide43.xml><?xml version="1.0" encoding="utf-8"?>
+<file path=ppt/slides/slide42.xml><?xml version="1.0" encoding="utf-8"?>
 <p:sld xmlns:a="http://schemas.openxmlformats.org/drawingml/2006/main" xmlns:r="http://schemas.openxmlformats.org/officeDocument/2006/relationships" xmlns:p="http://schemas.openxmlformats.org/presentationml/2006/main">
   <p:cSld>
     <p:spTree>
@@ -19314,7 +19463,7 @@
 </p:sld>
 </file>
 
-<file path=ppt/slides/slide44.xml><?xml version="1.0" encoding="utf-8"?>
+<file path=ppt/slides/slide43.xml><?xml version="1.0" encoding="utf-8"?>
 <p:sld xmlns:a="http://schemas.openxmlformats.org/drawingml/2006/main" xmlns:r="http://schemas.openxmlformats.org/officeDocument/2006/relationships" xmlns:p="http://schemas.openxmlformats.org/presentationml/2006/main">
   <p:cSld>
     <p:spTree>
@@ -19594,7 +19743,7 @@
           </a:ln>
           <a:extLst>
             <a:ext uri="{C572A759-6A51-4108-AA02-DFA0A04FC94B}">
-              <ma14:wrappingTextBoxFlag xmlns:ma14="http://schemas.microsoft.com/office/mac/drawingml/2011/main" xmlns:a14="http://schemas.microsoft.com/office/drawing/2010/main" xmlns:m="http://schemas.openxmlformats.org/officeDocument/2006/math" xmlns="" val="1"/>
+              <ma14:wrappingTextBoxFlag xmlns="" xmlns:m="http://schemas.openxmlformats.org/officeDocument/2006/math" xmlns:a14="http://schemas.microsoft.com/office/drawing/2010/main" xmlns:ma14="http://schemas.microsoft.com/office/mac/drawingml/2011/main" val="1"/>
             </a:ext>
           </a:extLst>
         </p:spPr>

</xml_diff>